<commit_message>
Uploading Colby's contributions to results section
</commit_message>
<xml_diff>
--- a/STAT 541 - Clusterfunc - Final Project Slides.pptx
+++ b/STAT 541 - Clusterfunc - Final Project Slides.pptx
@@ -4,6 +4,9 @@
   <p:sldMasterIdLst>
     <p:sldMasterId id="2147483648" r:id="rId1"/>
   </p:sldMasterIdLst>
+  <p:notesMasterIdLst>
+    <p:notesMasterId r:id="rId16"/>
+  </p:notesMasterIdLst>
   <p:sldIdLst>
     <p:sldId id="256" r:id="rId2"/>
     <p:sldId id="257" r:id="rId3"/>
@@ -11,11 +14,11 @@
     <p:sldId id="273" r:id="rId5"/>
     <p:sldId id="275" r:id="rId6"/>
     <p:sldId id="276" r:id="rId7"/>
-    <p:sldId id="282" r:id="rId8"/>
-    <p:sldId id="283" r:id="rId9"/>
-    <p:sldId id="277" r:id="rId10"/>
-    <p:sldId id="278" r:id="rId11"/>
-    <p:sldId id="279" r:id="rId12"/>
+    <p:sldId id="283" r:id="rId8"/>
+    <p:sldId id="277" r:id="rId9"/>
+    <p:sldId id="279" r:id="rId10"/>
+    <p:sldId id="284" r:id="rId11"/>
+    <p:sldId id="285" r:id="rId12"/>
     <p:sldId id="280" r:id="rId13"/>
     <p:sldId id="281" r:id="rId14"/>
     <p:sldId id="262" r:id="rId15"/>
@@ -119,7 +122,7 @@
   </p:defaultTextStyle>
   <p:extLst>
     <p:ext uri="{EFAFB233-063F-42B5-8137-9DF3F51BA10A}">
-      <p15:sldGuideLst xmlns:p15="http://schemas.microsoft.com/office/powerpoint/2012/main">
+      <p15:sldGuideLst xmlns:p15="http://schemas.microsoft.com/office/powerpoint/2012/main" xmlns="">
         <p15:guide id="1" orient="horz" pos="2880">
           <p15:clr>
             <a:srgbClr val="A4A3A4"/>
@@ -134,6 +137,1073 @@
     </p:ext>
   </p:extLst>
 </p:presentation>
+</file>
+
+<file path=ppt/notesMasters/notesMaster1.xml><?xml version="1.0" encoding="utf-8"?>
+<p:notesMaster xmlns:a="http://schemas.openxmlformats.org/drawingml/2006/main" xmlns:r="http://schemas.openxmlformats.org/officeDocument/2006/relationships" xmlns:p="http://schemas.openxmlformats.org/presentationml/2006/main">
+  <p:cSld>
+    <p:bg>
+      <p:bgRef idx="1001">
+        <a:schemeClr val="bg1"/>
+      </p:bgRef>
+    </p:bg>
+    <p:spTree>
+      <p:nvGrpSpPr>
+        <p:cNvPr id="1" name=""/>
+        <p:cNvGrpSpPr/>
+        <p:nvPr/>
+      </p:nvGrpSpPr>
+      <p:grpSpPr>
+        <a:xfrm>
+          <a:off x="0" y="0"/>
+          <a:ext cx="0" cy="0"/>
+          <a:chOff x="0" y="0"/>
+          <a:chExt cx="0" cy="0"/>
+        </a:xfrm>
+      </p:grpSpPr>
+      <p:sp>
+        <p:nvSpPr>
+          <p:cNvPr id="2" name="Header Placeholder 1"/>
+          <p:cNvSpPr>
+            <a:spLocks noGrp="1"/>
+          </p:cNvSpPr>
+          <p:nvPr>
+            <p:ph type="hdr" sz="quarter"/>
+          </p:nvPr>
+        </p:nvSpPr>
+        <p:spPr>
+          <a:xfrm>
+            <a:off x="0" y="0"/>
+            <a:ext cx="3962400" cy="257175"/>
+          </a:xfrm>
+          <a:prstGeom prst="rect">
+            <a:avLst/>
+          </a:prstGeom>
+        </p:spPr>
+        <p:txBody>
+          <a:bodyPr vert="horz" lIns="91440" tIns="45720" rIns="91440" bIns="45720" rtlCol="0"/>
+          <a:lstStyle>
+            <a:lvl1pPr algn="l">
+              <a:defRPr sz="1200"/>
+            </a:lvl1pPr>
+          </a:lstStyle>
+          <a:p>
+            <a:endParaRPr lang="en-CA"/>
+          </a:p>
+        </p:txBody>
+      </p:sp>
+      <p:sp>
+        <p:nvSpPr>
+          <p:cNvPr id="3" name="Date Placeholder 2"/>
+          <p:cNvSpPr>
+            <a:spLocks noGrp="1"/>
+          </p:cNvSpPr>
+          <p:nvPr>
+            <p:ph type="dt" idx="1"/>
+          </p:nvPr>
+        </p:nvSpPr>
+        <p:spPr>
+          <a:xfrm>
+            <a:off x="5180013" y="0"/>
+            <a:ext cx="3962400" cy="257175"/>
+          </a:xfrm>
+          <a:prstGeom prst="rect">
+            <a:avLst/>
+          </a:prstGeom>
+        </p:spPr>
+        <p:txBody>
+          <a:bodyPr vert="horz" lIns="91440" tIns="45720" rIns="91440" bIns="45720" rtlCol="0"/>
+          <a:lstStyle>
+            <a:lvl1pPr algn="r">
+              <a:defRPr sz="1200"/>
+            </a:lvl1pPr>
+          </a:lstStyle>
+          <a:p>
+            <a:fld id="{1F6C862A-0C42-49F9-81D0-B08A2EC00C7C}" type="datetimeFigureOut">
+              <a:rPr lang="en-CA" smtClean="0"/>
+              <a:t>2023-04-14</a:t>
+            </a:fld>
+            <a:endParaRPr lang="en-CA"/>
+          </a:p>
+        </p:txBody>
+      </p:sp>
+      <p:sp>
+        <p:nvSpPr>
+          <p:cNvPr id="4" name="Slide Image Placeholder 3"/>
+          <p:cNvSpPr>
+            <a:spLocks noGrp="1" noRot="1" noChangeAspect="1"/>
+          </p:cNvSpPr>
+          <p:nvPr>
+            <p:ph type="sldImg" idx="2"/>
+          </p:nvPr>
+        </p:nvSpPr>
+        <p:spPr>
+          <a:xfrm>
+            <a:off x="2857500" y="385763"/>
+            <a:ext cx="3429000" cy="1928812"/>
+          </a:xfrm>
+          <a:prstGeom prst="rect">
+            <a:avLst/>
+          </a:prstGeom>
+          <a:noFill/>
+          <a:ln w="12700">
+            <a:solidFill>
+              <a:prstClr val="black"/>
+            </a:solidFill>
+          </a:ln>
+        </p:spPr>
+        <p:txBody>
+          <a:bodyPr vert="horz" lIns="91440" tIns="45720" rIns="91440" bIns="45720" rtlCol="0" anchor="ctr"/>
+          <a:lstStyle/>
+          <a:p>
+            <a:endParaRPr lang="en-CA"/>
+          </a:p>
+        </p:txBody>
+      </p:sp>
+      <p:sp>
+        <p:nvSpPr>
+          <p:cNvPr id="5" name="Notes Placeholder 4"/>
+          <p:cNvSpPr>
+            <a:spLocks noGrp="1"/>
+          </p:cNvSpPr>
+          <p:nvPr>
+            <p:ph type="body" sz="quarter" idx="3"/>
+          </p:nvPr>
+        </p:nvSpPr>
+        <p:spPr>
+          <a:xfrm>
+            <a:off x="914400" y="2443163"/>
+            <a:ext cx="7315200" cy="2314575"/>
+          </a:xfrm>
+          <a:prstGeom prst="rect">
+            <a:avLst/>
+          </a:prstGeom>
+        </p:spPr>
+        <p:txBody>
+          <a:bodyPr vert="horz" lIns="91440" tIns="45720" rIns="91440" bIns="45720" rtlCol="0"/>
+          <a:lstStyle/>
+          <a:p>
+            <a:pPr lvl="0"/>
+            <a:r>
+              <a:rPr lang="en-US" smtClean="0"/>
+              <a:t>Click to edit Master text styles</a:t>
+            </a:r>
+          </a:p>
+          <a:p>
+            <a:pPr lvl="1"/>
+            <a:r>
+              <a:rPr lang="en-US" smtClean="0"/>
+              <a:t>Second level</a:t>
+            </a:r>
+          </a:p>
+          <a:p>
+            <a:pPr lvl="2"/>
+            <a:r>
+              <a:rPr lang="en-US" smtClean="0"/>
+              <a:t>Third level</a:t>
+            </a:r>
+          </a:p>
+          <a:p>
+            <a:pPr lvl="3"/>
+            <a:r>
+              <a:rPr lang="en-US" smtClean="0"/>
+              <a:t>Fourth level</a:t>
+            </a:r>
+          </a:p>
+          <a:p>
+            <a:pPr lvl="4"/>
+            <a:r>
+              <a:rPr lang="en-US" smtClean="0"/>
+              <a:t>Fifth level</a:t>
+            </a:r>
+            <a:endParaRPr lang="en-CA"/>
+          </a:p>
+        </p:txBody>
+      </p:sp>
+      <p:sp>
+        <p:nvSpPr>
+          <p:cNvPr id="6" name="Footer Placeholder 5"/>
+          <p:cNvSpPr>
+            <a:spLocks noGrp="1"/>
+          </p:cNvSpPr>
+          <p:nvPr>
+            <p:ph type="ftr" sz="quarter" idx="4"/>
+          </p:nvPr>
+        </p:nvSpPr>
+        <p:spPr>
+          <a:xfrm>
+            <a:off x="0" y="4884738"/>
+            <a:ext cx="3962400" cy="257175"/>
+          </a:xfrm>
+          <a:prstGeom prst="rect">
+            <a:avLst/>
+          </a:prstGeom>
+        </p:spPr>
+        <p:txBody>
+          <a:bodyPr vert="horz" lIns="91440" tIns="45720" rIns="91440" bIns="45720" rtlCol="0" anchor="b"/>
+          <a:lstStyle>
+            <a:lvl1pPr algn="l">
+              <a:defRPr sz="1200"/>
+            </a:lvl1pPr>
+          </a:lstStyle>
+          <a:p>
+            <a:endParaRPr lang="en-CA"/>
+          </a:p>
+        </p:txBody>
+      </p:sp>
+      <p:sp>
+        <p:nvSpPr>
+          <p:cNvPr id="7" name="Slide Number Placeholder 6"/>
+          <p:cNvSpPr>
+            <a:spLocks noGrp="1"/>
+          </p:cNvSpPr>
+          <p:nvPr>
+            <p:ph type="sldNum" sz="quarter" idx="5"/>
+          </p:nvPr>
+        </p:nvSpPr>
+        <p:spPr>
+          <a:xfrm>
+            <a:off x="5180013" y="4884738"/>
+            <a:ext cx="3962400" cy="257175"/>
+          </a:xfrm>
+          <a:prstGeom prst="rect">
+            <a:avLst/>
+          </a:prstGeom>
+        </p:spPr>
+        <p:txBody>
+          <a:bodyPr vert="horz" lIns="91440" tIns="45720" rIns="91440" bIns="45720" rtlCol="0" anchor="b"/>
+          <a:lstStyle>
+            <a:lvl1pPr algn="r">
+              <a:defRPr sz="1200"/>
+            </a:lvl1pPr>
+          </a:lstStyle>
+          <a:p>
+            <a:fld id="{8A4ECBF0-02C6-40DA-8E97-5B6C9ADE2689}" type="slidenum">
+              <a:rPr lang="en-CA" smtClean="0"/>
+              <a:t>‹#›</a:t>
+            </a:fld>
+            <a:endParaRPr lang="en-CA"/>
+          </a:p>
+        </p:txBody>
+      </p:sp>
+    </p:spTree>
+    <p:extLst>
+      <p:ext uri="{BB962C8B-B14F-4D97-AF65-F5344CB8AC3E}">
+        <p14:creationId xmlns:p14="http://schemas.microsoft.com/office/powerpoint/2010/main" val="3507232489"/>
+      </p:ext>
+    </p:extLst>
+  </p:cSld>
+  <p:clrMap bg1="lt1" tx1="dk1" bg2="lt2" tx2="dk2" accent1="accent1" accent2="accent2" accent3="accent3" accent4="accent4" accent5="accent5" accent6="accent6" hlink="hlink" folHlink="folHlink"/>
+  <p:notesStyle>
+    <a:lvl1pPr marL="0" algn="l" defTabSz="914400" rtl="0" eaLnBrk="1" latinLnBrk="0" hangingPunct="1">
+      <a:defRPr sz="1200" kern="1200">
+        <a:solidFill>
+          <a:schemeClr val="tx1"/>
+        </a:solidFill>
+        <a:latin typeface="+mn-lt"/>
+        <a:ea typeface="+mn-ea"/>
+        <a:cs typeface="+mn-cs"/>
+      </a:defRPr>
+    </a:lvl1pPr>
+    <a:lvl2pPr marL="457200" algn="l" defTabSz="914400" rtl="0" eaLnBrk="1" latinLnBrk="0" hangingPunct="1">
+      <a:defRPr sz="1200" kern="1200">
+        <a:solidFill>
+          <a:schemeClr val="tx1"/>
+        </a:solidFill>
+        <a:latin typeface="+mn-lt"/>
+        <a:ea typeface="+mn-ea"/>
+        <a:cs typeface="+mn-cs"/>
+      </a:defRPr>
+    </a:lvl2pPr>
+    <a:lvl3pPr marL="914400" algn="l" defTabSz="914400" rtl="0" eaLnBrk="1" latinLnBrk="0" hangingPunct="1">
+      <a:defRPr sz="1200" kern="1200">
+        <a:solidFill>
+          <a:schemeClr val="tx1"/>
+        </a:solidFill>
+        <a:latin typeface="+mn-lt"/>
+        <a:ea typeface="+mn-ea"/>
+        <a:cs typeface="+mn-cs"/>
+      </a:defRPr>
+    </a:lvl3pPr>
+    <a:lvl4pPr marL="1371600" algn="l" defTabSz="914400" rtl="0" eaLnBrk="1" latinLnBrk="0" hangingPunct="1">
+      <a:defRPr sz="1200" kern="1200">
+        <a:solidFill>
+          <a:schemeClr val="tx1"/>
+        </a:solidFill>
+        <a:latin typeface="+mn-lt"/>
+        <a:ea typeface="+mn-ea"/>
+        <a:cs typeface="+mn-cs"/>
+      </a:defRPr>
+    </a:lvl4pPr>
+    <a:lvl5pPr marL="1828800" algn="l" defTabSz="914400" rtl="0" eaLnBrk="1" latinLnBrk="0" hangingPunct="1">
+      <a:defRPr sz="1200" kern="1200">
+        <a:solidFill>
+          <a:schemeClr val="tx1"/>
+        </a:solidFill>
+        <a:latin typeface="+mn-lt"/>
+        <a:ea typeface="+mn-ea"/>
+        <a:cs typeface="+mn-cs"/>
+      </a:defRPr>
+    </a:lvl5pPr>
+    <a:lvl6pPr marL="2286000" algn="l" defTabSz="914400" rtl="0" eaLnBrk="1" latinLnBrk="0" hangingPunct="1">
+      <a:defRPr sz="1200" kern="1200">
+        <a:solidFill>
+          <a:schemeClr val="tx1"/>
+        </a:solidFill>
+        <a:latin typeface="+mn-lt"/>
+        <a:ea typeface="+mn-ea"/>
+        <a:cs typeface="+mn-cs"/>
+      </a:defRPr>
+    </a:lvl6pPr>
+    <a:lvl7pPr marL="2743200" algn="l" defTabSz="914400" rtl="0" eaLnBrk="1" latinLnBrk="0" hangingPunct="1">
+      <a:defRPr sz="1200" kern="1200">
+        <a:solidFill>
+          <a:schemeClr val="tx1"/>
+        </a:solidFill>
+        <a:latin typeface="+mn-lt"/>
+        <a:ea typeface="+mn-ea"/>
+        <a:cs typeface="+mn-cs"/>
+      </a:defRPr>
+    </a:lvl7pPr>
+    <a:lvl8pPr marL="3200400" algn="l" defTabSz="914400" rtl="0" eaLnBrk="1" latinLnBrk="0" hangingPunct="1">
+      <a:defRPr sz="1200" kern="1200">
+        <a:solidFill>
+          <a:schemeClr val="tx1"/>
+        </a:solidFill>
+        <a:latin typeface="+mn-lt"/>
+        <a:ea typeface="+mn-ea"/>
+        <a:cs typeface="+mn-cs"/>
+      </a:defRPr>
+    </a:lvl8pPr>
+    <a:lvl9pPr marL="3657600" algn="l" defTabSz="914400" rtl="0" eaLnBrk="1" latinLnBrk="0" hangingPunct="1">
+      <a:defRPr sz="1200" kern="1200">
+        <a:solidFill>
+          <a:schemeClr val="tx1"/>
+        </a:solidFill>
+        <a:latin typeface="+mn-lt"/>
+        <a:ea typeface="+mn-ea"/>
+        <a:cs typeface="+mn-cs"/>
+      </a:defRPr>
+    </a:lvl9pPr>
+  </p:notesStyle>
+</p:notesMaster>
+</file>
+
+<file path=ppt/notesSlides/notesSlide1.xml><?xml version="1.0" encoding="utf-8"?>
+<p:notes xmlns:a="http://schemas.openxmlformats.org/drawingml/2006/main" xmlns:r="http://schemas.openxmlformats.org/officeDocument/2006/relationships" xmlns:p="http://schemas.openxmlformats.org/presentationml/2006/main">
+  <p:cSld>
+    <p:spTree>
+      <p:nvGrpSpPr>
+        <p:cNvPr id="1" name=""/>
+        <p:cNvGrpSpPr/>
+        <p:nvPr/>
+      </p:nvGrpSpPr>
+      <p:grpSpPr>
+        <a:xfrm>
+          <a:off x="0" y="0"/>
+          <a:ext cx="0" cy="0"/>
+          <a:chOff x="0" y="0"/>
+          <a:chExt cx="0" cy="0"/>
+        </a:xfrm>
+      </p:grpSpPr>
+      <p:sp>
+        <p:nvSpPr>
+          <p:cNvPr id="2" name="Slide Image Placeholder 1"/>
+          <p:cNvSpPr>
+            <a:spLocks noGrp="1" noRot="1" noChangeAspect="1"/>
+          </p:cNvSpPr>
+          <p:nvPr>
+            <p:ph type="sldImg"/>
+          </p:nvPr>
+        </p:nvSpPr>
+        <p:spPr/>
+      </p:sp>
+      <p:sp>
+        <p:nvSpPr>
+          <p:cNvPr id="3" name="Notes Placeholder 2"/>
+          <p:cNvSpPr>
+            <a:spLocks noGrp="1"/>
+          </p:cNvSpPr>
+          <p:nvPr>
+            <p:ph type="body" idx="1"/>
+          </p:nvPr>
+        </p:nvSpPr>
+        <p:spPr/>
+        <p:txBody>
+          <a:bodyPr/>
+          <a:lstStyle/>
+          <a:p>
+            <a:pPr marL="285750" indent="-285750">
+              <a:buFont typeface="Courier New" panose="02070309020205020404" pitchFamily="49" charset="0"/>
+              <a:buChar char="o"/>
+            </a:pPr>
+            <a:r>
+              <a:rPr lang="en-US" dirty="0" smtClean="0"/>
+              <a:t>Used a convolutional network for the model. Shape and size of the neural network can be found on the train-</a:t>
+            </a:r>
+            <a:r>
+              <a:rPr lang="en-US" dirty="0" err="1" smtClean="0"/>
+              <a:t>results.ipynb</a:t>
+            </a:r>
+            <a:r>
+              <a:rPr lang="en-US" dirty="0" smtClean="0"/>
+              <a:t> file:</a:t>
+            </a:r>
+          </a:p>
+          <a:p>
+            <a:pPr marL="742950" lvl="1" indent="-285750">
+              <a:buFont typeface="Wingdings" panose="05000000000000000000" pitchFamily="2" charset="2"/>
+              <a:buChar char="§"/>
+            </a:pPr>
+            <a:r>
+              <a:rPr lang="en-US" dirty="0" smtClean="0"/>
+              <a:t>Sub-sentence</a:t>
+            </a:r>
+          </a:p>
+          <a:p>
+            <a:endParaRPr lang="en-CA" dirty="0"/>
+          </a:p>
+        </p:txBody>
+      </p:sp>
+      <p:sp>
+        <p:nvSpPr>
+          <p:cNvPr id="4" name="Slide Number Placeholder 3"/>
+          <p:cNvSpPr>
+            <a:spLocks noGrp="1"/>
+          </p:cNvSpPr>
+          <p:nvPr>
+            <p:ph type="sldNum" sz="quarter" idx="10"/>
+          </p:nvPr>
+        </p:nvSpPr>
+        <p:spPr/>
+        <p:txBody>
+          <a:bodyPr/>
+          <a:lstStyle/>
+          <a:p>
+            <a:fld id="{8A4ECBF0-02C6-40DA-8E97-5B6C9ADE2689}" type="slidenum">
+              <a:rPr lang="en-CA" smtClean="0"/>
+              <a:t>7</a:t>
+            </a:fld>
+            <a:endParaRPr lang="en-CA"/>
+          </a:p>
+        </p:txBody>
+      </p:sp>
+    </p:spTree>
+    <p:extLst>
+      <p:ext uri="{BB962C8B-B14F-4D97-AF65-F5344CB8AC3E}">
+        <p14:creationId xmlns:p14="http://schemas.microsoft.com/office/powerpoint/2010/main" val="246516044"/>
+      </p:ext>
+    </p:extLst>
+  </p:cSld>
+  <p:clrMapOvr>
+    <a:masterClrMapping/>
+  </p:clrMapOvr>
+</p:notes>
+</file>
+
+<file path=ppt/notesSlides/notesSlide2.xml><?xml version="1.0" encoding="utf-8"?>
+<p:notes xmlns:a="http://schemas.openxmlformats.org/drawingml/2006/main" xmlns:r="http://schemas.openxmlformats.org/officeDocument/2006/relationships" xmlns:p="http://schemas.openxmlformats.org/presentationml/2006/main">
+  <p:cSld>
+    <p:spTree>
+      <p:nvGrpSpPr>
+        <p:cNvPr id="1" name=""/>
+        <p:cNvGrpSpPr/>
+        <p:nvPr/>
+      </p:nvGrpSpPr>
+      <p:grpSpPr>
+        <a:xfrm>
+          <a:off x="0" y="0"/>
+          <a:ext cx="0" cy="0"/>
+          <a:chOff x="0" y="0"/>
+          <a:chExt cx="0" cy="0"/>
+        </a:xfrm>
+      </p:grpSpPr>
+      <p:sp>
+        <p:nvSpPr>
+          <p:cNvPr id="2" name="Slide Image Placeholder 1"/>
+          <p:cNvSpPr>
+            <a:spLocks noGrp="1" noRot="1" noChangeAspect="1"/>
+          </p:cNvSpPr>
+          <p:nvPr>
+            <p:ph type="sldImg"/>
+          </p:nvPr>
+        </p:nvSpPr>
+        <p:spPr/>
+      </p:sp>
+      <p:sp>
+        <p:nvSpPr>
+          <p:cNvPr id="3" name="Notes Placeholder 2"/>
+          <p:cNvSpPr>
+            <a:spLocks noGrp="1"/>
+          </p:cNvSpPr>
+          <p:nvPr>
+            <p:ph type="body" idx="1"/>
+          </p:nvPr>
+        </p:nvSpPr>
+        <p:spPr/>
+        <p:txBody>
+          <a:bodyPr/>
+          <a:lstStyle/>
+          <a:p>
+            <a:pPr marL="285750" indent="-285750">
+              <a:buFont typeface="Courier New" panose="02070309020205020404" pitchFamily="49" charset="0"/>
+              <a:buChar char="o"/>
+            </a:pPr>
+            <a:r>
+              <a:rPr lang="en-US" dirty="0" smtClean="0"/>
+              <a:t>Model was trained for 10 epochs on 5 batches of 1800 images. So a total of 9000 images were used to train the model split equally between DALL-E generated and Human made images:</a:t>
+            </a:r>
+          </a:p>
+          <a:p>
+            <a:pPr marL="742950" lvl="1" indent="-285750">
+              <a:buFont typeface="Wingdings" panose="05000000000000000000" pitchFamily="2" charset="2"/>
+              <a:buChar char="§"/>
+            </a:pPr>
+            <a:r>
+              <a:rPr lang="en-US" dirty="0" smtClean="0"/>
+              <a:t>Sub-sentence</a:t>
+            </a:r>
+          </a:p>
+          <a:p>
+            <a:pPr marL="742950" lvl="1" indent="-285750">
+              <a:buFont typeface="Wingdings" panose="05000000000000000000" pitchFamily="2" charset="2"/>
+              <a:buChar char="§"/>
+            </a:pPr>
+            <a:endParaRPr lang="en-US" dirty="0" smtClean="0"/>
+          </a:p>
+          <a:p>
+            <a:pPr marL="285750" indent="-285750">
+              <a:buFont typeface="Courier New" panose="02070309020205020404" pitchFamily="49" charset="0"/>
+              <a:buChar char="o"/>
+            </a:pPr>
+            <a:r>
+              <a:rPr lang="en-US" dirty="0" smtClean="0"/>
+              <a:t>Test batch was 1580 images 930 of which were </a:t>
+            </a:r>
+            <a:r>
+              <a:rPr lang="en-US" dirty="0" err="1" smtClean="0"/>
+              <a:t>dall</a:t>
+            </a:r>
+            <a:r>
+              <a:rPr lang="en-US" dirty="0" smtClean="0"/>
+              <a:t>-e generated and 650 human made:</a:t>
+            </a:r>
+          </a:p>
+          <a:p>
+            <a:pPr marL="742950" lvl="1" indent="-285750">
+              <a:buFont typeface="Wingdings" panose="05000000000000000000" pitchFamily="2" charset="2"/>
+              <a:buChar char="§"/>
+            </a:pPr>
+            <a:r>
+              <a:rPr lang="en-US" dirty="0" smtClean="0"/>
+              <a:t>Sub-sentence</a:t>
+            </a:r>
+          </a:p>
+          <a:p>
+            <a:pPr marL="742950" lvl="1" indent="-285750">
+              <a:buFont typeface="Wingdings" panose="05000000000000000000" pitchFamily="2" charset="2"/>
+              <a:buChar char="§"/>
+            </a:pPr>
+            <a:endParaRPr lang="en-US" dirty="0" smtClean="0"/>
+          </a:p>
+          <a:p>
+            <a:endParaRPr lang="en-CA" dirty="0"/>
+          </a:p>
+        </p:txBody>
+      </p:sp>
+      <p:sp>
+        <p:nvSpPr>
+          <p:cNvPr id="4" name="Slide Number Placeholder 3"/>
+          <p:cNvSpPr>
+            <a:spLocks noGrp="1"/>
+          </p:cNvSpPr>
+          <p:nvPr>
+            <p:ph type="sldNum" sz="quarter" idx="10"/>
+          </p:nvPr>
+        </p:nvSpPr>
+        <p:spPr/>
+        <p:txBody>
+          <a:bodyPr/>
+          <a:lstStyle/>
+          <a:p>
+            <a:fld id="{8A4ECBF0-02C6-40DA-8E97-5B6C9ADE2689}" type="slidenum">
+              <a:rPr lang="en-CA" smtClean="0"/>
+              <a:t>8</a:t>
+            </a:fld>
+            <a:endParaRPr lang="en-CA"/>
+          </a:p>
+        </p:txBody>
+      </p:sp>
+    </p:spTree>
+    <p:extLst>
+      <p:ext uri="{BB962C8B-B14F-4D97-AF65-F5344CB8AC3E}">
+        <p14:creationId xmlns:p14="http://schemas.microsoft.com/office/powerpoint/2010/main" val="275860606"/>
+      </p:ext>
+    </p:extLst>
+  </p:cSld>
+  <p:clrMapOvr>
+    <a:masterClrMapping/>
+  </p:clrMapOvr>
+</p:notes>
+</file>
+
+<file path=ppt/notesSlides/notesSlide3.xml><?xml version="1.0" encoding="utf-8"?>
+<p:notes xmlns:a="http://schemas.openxmlformats.org/drawingml/2006/main" xmlns:r="http://schemas.openxmlformats.org/officeDocument/2006/relationships" xmlns:p="http://schemas.openxmlformats.org/presentationml/2006/main">
+  <p:cSld>
+    <p:spTree>
+      <p:nvGrpSpPr>
+        <p:cNvPr id="1" name=""/>
+        <p:cNvGrpSpPr/>
+        <p:nvPr/>
+      </p:nvGrpSpPr>
+      <p:grpSpPr>
+        <a:xfrm>
+          <a:off x="0" y="0"/>
+          <a:ext cx="0" cy="0"/>
+          <a:chOff x="0" y="0"/>
+          <a:chExt cx="0" cy="0"/>
+        </a:xfrm>
+      </p:grpSpPr>
+      <p:sp>
+        <p:nvSpPr>
+          <p:cNvPr id="2" name="Slide Image Placeholder 1"/>
+          <p:cNvSpPr>
+            <a:spLocks noGrp="1" noRot="1" noChangeAspect="1"/>
+          </p:cNvSpPr>
+          <p:nvPr>
+            <p:ph type="sldImg"/>
+          </p:nvPr>
+        </p:nvSpPr>
+        <p:spPr/>
+      </p:sp>
+      <p:sp>
+        <p:nvSpPr>
+          <p:cNvPr id="3" name="Notes Placeholder 2"/>
+          <p:cNvSpPr>
+            <a:spLocks noGrp="1"/>
+          </p:cNvSpPr>
+          <p:nvPr>
+            <p:ph type="body" idx="1"/>
+          </p:nvPr>
+        </p:nvSpPr>
+        <p:spPr/>
+        <p:txBody>
+          <a:bodyPr/>
+          <a:lstStyle/>
+          <a:p>
+            <a:pPr marL="285750" indent="-285750">
+              <a:buFont typeface="Courier New" panose="02070309020205020404" pitchFamily="49" charset="0"/>
+              <a:buChar char="o"/>
+            </a:pPr>
+            <a:r>
+              <a:rPr lang="en-US" dirty="0" smtClean="0"/>
+              <a:t>The 50 epochs on the graph for accuracy are because of the 10 epochs for 5 batches (10x5 = 50):</a:t>
+            </a:r>
+          </a:p>
+          <a:p>
+            <a:pPr marL="285750" indent="-285750">
+              <a:buFont typeface="Courier New" panose="02070309020205020404" pitchFamily="49" charset="0"/>
+              <a:buChar char="o"/>
+            </a:pPr>
+            <a:endParaRPr lang="en-US" dirty="0" smtClean="0"/>
+          </a:p>
+          <a:p>
+            <a:pPr marL="285750" indent="-285750">
+              <a:buFont typeface="Courier New" panose="02070309020205020404" pitchFamily="49" charset="0"/>
+              <a:buChar char="o"/>
+            </a:pPr>
+            <a:r>
+              <a:rPr lang="en-US" dirty="0" smtClean="0"/>
+              <a:t>I’ve made graphs of accuracy, confusion matrix (for </a:t>
+            </a:r>
+            <a:r>
+              <a:rPr lang="en-US" dirty="0" err="1" smtClean="0"/>
+              <a:t>fp</a:t>
+            </a:r>
+            <a:r>
+              <a:rPr lang="en-US" dirty="0" smtClean="0"/>
+              <a:t> </a:t>
+            </a:r>
+            <a:r>
+              <a:rPr lang="en-US" dirty="0" err="1" smtClean="0"/>
+              <a:t>tp</a:t>
+            </a:r>
+            <a:r>
+              <a:rPr lang="en-US" dirty="0" smtClean="0"/>
+              <a:t> </a:t>
+            </a:r>
+            <a:r>
+              <a:rPr lang="en-US" dirty="0" err="1" smtClean="0"/>
+              <a:t>fn</a:t>
+            </a:r>
+            <a:r>
+              <a:rPr lang="en-US" dirty="0" smtClean="0"/>
+              <a:t> and </a:t>
+            </a:r>
+            <a:r>
+              <a:rPr lang="en-US" dirty="0" err="1" smtClean="0"/>
+              <a:t>tn</a:t>
+            </a:r>
+            <a:r>
+              <a:rPr lang="en-US" dirty="0" smtClean="0"/>
+              <a:t> rates), and the ROC and AUC curve</a:t>
+            </a:r>
+          </a:p>
+          <a:p>
+            <a:pPr marL="742950" lvl="1" indent="-285750">
+              <a:buFont typeface="Wingdings" panose="05000000000000000000" pitchFamily="2" charset="2"/>
+              <a:buChar char="§"/>
+            </a:pPr>
+            <a:r>
+              <a:rPr lang="en-US" dirty="0" smtClean="0"/>
+              <a:t>Sub-sentence</a:t>
+            </a:r>
+          </a:p>
+          <a:p>
+            <a:endParaRPr lang="en-CA" dirty="0"/>
+          </a:p>
+        </p:txBody>
+      </p:sp>
+      <p:sp>
+        <p:nvSpPr>
+          <p:cNvPr id="4" name="Slide Number Placeholder 3"/>
+          <p:cNvSpPr>
+            <a:spLocks noGrp="1"/>
+          </p:cNvSpPr>
+          <p:nvPr>
+            <p:ph type="sldNum" sz="quarter" idx="10"/>
+          </p:nvPr>
+        </p:nvSpPr>
+        <p:spPr/>
+        <p:txBody>
+          <a:bodyPr/>
+          <a:lstStyle/>
+          <a:p>
+            <a:fld id="{8A4ECBF0-02C6-40DA-8E97-5B6C9ADE2689}" type="slidenum">
+              <a:rPr lang="en-CA" smtClean="0"/>
+              <a:t>9</a:t>
+            </a:fld>
+            <a:endParaRPr lang="en-CA"/>
+          </a:p>
+        </p:txBody>
+      </p:sp>
+    </p:spTree>
+    <p:extLst>
+      <p:ext uri="{BB962C8B-B14F-4D97-AF65-F5344CB8AC3E}">
+        <p14:creationId xmlns:p14="http://schemas.microsoft.com/office/powerpoint/2010/main" val="1008915142"/>
+      </p:ext>
+    </p:extLst>
+  </p:cSld>
+  <p:clrMapOvr>
+    <a:masterClrMapping/>
+  </p:clrMapOvr>
+</p:notes>
+</file>
+
+<file path=ppt/notesSlides/notesSlide4.xml><?xml version="1.0" encoding="utf-8"?>
+<p:notes xmlns:a="http://schemas.openxmlformats.org/drawingml/2006/main" xmlns:r="http://schemas.openxmlformats.org/officeDocument/2006/relationships" xmlns:p="http://schemas.openxmlformats.org/presentationml/2006/main">
+  <p:cSld>
+    <p:spTree>
+      <p:nvGrpSpPr>
+        <p:cNvPr id="1" name=""/>
+        <p:cNvGrpSpPr/>
+        <p:nvPr/>
+      </p:nvGrpSpPr>
+      <p:grpSpPr>
+        <a:xfrm>
+          <a:off x="0" y="0"/>
+          <a:ext cx="0" cy="0"/>
+          <a:chOff x="0" y="0"/>
+          <a:chExt cx="0" cy="0"/>
+        </a:xfrm>
+      </p:grpSpPr>
+      <p:sp>
+        <p:nvSpPr>
+          <p:cNvPr id="2" name="Slide Image Placeholder 1"/>
+          <p:cNvSpPr>
+            <a:spLocks noGrp="1" noRot="1" noChangeAspect="1"/>
+          </p:cNvSpPr>
+          <p:nvPr>
+            <p:ph type="sldImg"/>
+          </p:nvPr>
+        </p:nvSpPr>
+        <p:spPr/>
+      </p:sp>
+      <p:sp>
+        <p:nvSpPr>
+          <p:cNvPr id="3" name="Notes Placeholder 2"/>
+          <p:cNvSpPr>
+            <a:spLocks noGrp="1"/>
+          </p:cNvSpPr>
+          <p:nvPr>
+            <p:ph type="body" idx="1"/>
+          </p:nvPr>
+        </p:nvSpPr>
+        <p:spPr/>
+        <p:txBody>
+          <a:bodyPr/>
+          <a:lstStyle/>
+          <a:p>
+            <a:pPr marL="285750" indent="-285750">
+              <a:buFont typeface="Courier New" panose="02070309020205020404" pitchFamily="49" charset="0"/>
+              <a:buChar char="o"/>
+            </a:pPr>
+            <a:r>
+              <a:rPr lang="en-US" dirty="0" smtClean="0"/>
+              <a:t>The 50 epochs on the graph for accuracy are because of the 10 epochs for 5 batches (10x5 = 50):</a:t>
+            </a:r>
+          </a:p>
+          <a:p>
+            <a:pPr marL="285750" indent="-285750">
+              <a:buFont typeface="Courier New" panose="02070309020205020404" pitchFamily="49" charset="0"/>
+              <a:buChar char="o"/>
+            </a:pPr>
+            <a:endParaRPr lang="en-US" dirty="0" smtClean="0"/>
+          </a:p>
+          <a:p>
+            <a:pPr marL="285750" indent="-285750">
+              <a:buFont typeface="Courier New" panose="02070309020205020404" pitchFamily="49" charset="0"/>
+              <a:buChar char="o"/>
+            </a:pPr>
+            <a:r>
+              <a:rPr lang="en-US" dirty="0" smtClean="0"/>
+              <a:t>I’ve made graphs of accuracy, confusion matrix (for </a:t>
+            </a:r>
+            <a:r>
+              <a:rPr lang="en-US" dirty="0" err="1" smtClean="0"/>
+              <a:t>fp</a:t>
+            </a:r>
+            <a:r>
+              <a:rPr lang="en-US" dirty="0" smtClean="0"/>
+              <a:t> </a:t>
+            </a:r>
+            <a:r>
+              <a:rPr lang="en-US" dirty="0" err="1" smtClean="0"/>
+              <a:t>tp</a:t>
+            </a:r>
+            <a:r>
+              <a:rPr lang="en-US" dirty="0" smtClean="0"/>
+              <a:t> </a:t>
+            </a:r>
+            <a:r>
+              <a:rPr lang="en-US" dirty="0" err="1" smtClean="0"/>
+              <a:t>fn</a:t>
+            </a:r>
+            <a:r>
+              <a:rPr lang="en-US" dirty="0" smtClean="0"/>
+              <a:t> and </a:t>
+            </a:r>
+            <a:r>
+              <a:rPr lang="en-US" dirty="0" err="1" smtClean="0"/>
+              <a:t>tn</a:t>
+            </a:r>
+            <a:r>
+              <a:rPr lang="en-US" dirty="0" smtClean="0"/>
+              <a:t> rates), and the ROC and AUC curve</a:t>
+            </a:r>
+          </a:p>
+          <a:p>
+            <a:pPr marL="742950" lvl="1" indent="-285750">
+              <a:buFont typeface="Wingdings" panose="05000000000000000000" pitchFamily="2" charset="2"/>
+              <a:buChar char="§"/>
+            </a:pPr>
+            <a:r>
+              <a:rPr lang="en-US" smtClean="0"/>
+              <a:t>Sub-sentence</a:t>
+            </a:r>
+          </a:p>
+          <a:p>
+            <a:endParaRPr lang="en-CA"/>
+          </a:p>
+        </p:txBody>
+      </p:sp>
+      <p:sp>
+        <p:nvSpPr>
+          <p:cNvPr id="4" name="Slide Number Placeholder 3"/>
+          <p:cNvSpPr>
+            <a:spLocks noGrp="1"/>
+          </p:cNvSpPr>
+          <p:nvPr>
+            <p:ph type="sldNum" sz="quarter" idx="10"/>
+          </p:nvPr>
+        </p:nvSpPr>
+        <p:spPr/>
+        <p:txBody>
+          <a:bodyPr/>
+          <a:lstStyle/>
+          <a:p>
+            <a:fld id="{8A4ECBF0-02C6-40DA-8E97-5B6C9ADE2689}" type="slidenum">
+              <a:rPr lang="en-CA" smtClean="0"/>
+              <a:t>10</a:t>
+            </a:fld>
+            <a:endParaRPr lang="en-CA"/>
+          </a:p>
+        </p:txBody>
+      </p:sp>
+    </p:spTree>
+    <p:extLst>
+      <p:ext uri="{BB962C8B-B14F-4D97-AF65-F5344CB8AC3E}">
+        <p14:creationId xmlns:p14="http://schemas.microsoft.com/office/powerpoint/2010/main" val="1008915142"/>
+      </p:ext>
+    </p:extLst>
+  </p:cSld>
+  <p:clrMapOvr>
+    <a:masterClrMapping/>
+  </p:clrMapOvr>
+</p:notes>
+</file>
+
+<file path=ppt/notesSlides/notesSlide5.xml><?xml version="1.0" encoding="utf-8"?>
+<p:notes xmlns:a="http://schemas.openxmlformats.org/drawingml/2006/main" xmlns:r="http://schemas.openxmlformats.org/officeDocument/2006/relationships" xmlns:p="http://schemas.openxmlformats.org/presentationml/2006/main">
+  <p:cSld>
+    <p:spTree>
+      <p:nvGrpSpPr>
+        <p:cNvPr id="1" name=""/>
+        <p:cNvGrpSpPr/>
+        <p:nvPr/>
+      </p:nvGrpSpPr>
+      <p:grpSpPr>
+        <a:xfrm>
+          <a:off x="0" y="0"/>
+          <a:ext cx="0" cy="0"/>
+          <a:chOff x="0" y="0"/>
+          <a:chExt cx="0" cy="0"/>
+        </a:xfrm>
+      </p:grpSpPr>
+      <p:sp>
+        <p:nvSpPr>
+          <p:cNvPr id="2" name="Slide Image Placeholder 1"/>
+          <p:cNvSpPr>
+            <a:spLocks noGrp="1" noRot="1" noChangeAspect="1"/>
+          </p:cNvSpPr>
+          <p:nvPr>
+            <p:ph type="sldImg"/>
+          </p:nvPr>
+        </p:nvSpPr>
+        <p:spPr/>
+      </p:sp>
+      <p:sp>
+        <p:nvSpPr>
+          <p:cNvPr id="3" name="Notes Placeholder 2"/>
+          <p:cNvSpPr>
+            <a:spLocks noGrp="1"/>
+          </p:cNvSpPr>
+          <p:nvPr>
+            <p:ph type="body" idx="1"/>
+          </p:nvPr>
+        </p:nvSpPr>
+        <p:spPr/>
+        <p:txBody>
+          <a:bodyPr/>
+          <a:lstStyle/>
+          <a:p>
+            <a:pPr marL="285750" indent="-285750">
+              <a:buFont typeface="Courier New" panose="02070309020205020404" pitchFamily="49" charset="0"/>
+              <a:buChar char="o"/>
+            </a:pPr>
+            <a:r>
+              <a:rPr lang="en-US" dirty="0" smtClean="0"/>
+              <a:t>The 50 epochs on the graph for accuracy are because of the 10 epochs for 5 batches (10x5 = 50):</a:t>
+            </a:r>
+          </a:p>
+          <a:p>
+            <a:pPr marL="285750" indent="-285750">
+              <a:buFont typeface="Courier New" panose="02070309020205020404" pitchFamily="49" charset="0"/>
+              <a:buChar char="o"/>
+            </a:pPr>
+            <a:endParaRPr lang="en-US" dirty="0" smtClean="0"/>
+          </a:p>
+          <a:p>
+            <a:pPr marL="285750" indent="-285750">
+              <a:buFont typeface="Courier New" panose="02070309020205020404" pitchFamily="49" charset="0"/>
+              <a:buChar char="o"/>
+            </a:pPr>
+            <a:r>
+              <a:rPr lang="en-US" dirty="0" smtClean="0"/>
+              <a:t>I’ve made graphs of accuracy, confusion matrix (for </a:t>
+            </a:r>
+            <a:r>
+              <a:rPr lang="en-US" dirty="0" err="1" smtClean="0"/>
+              <a:t>fp</a:t>
+            </a:r>
+            <a:r>
+              <a:rPr lang="en-US" dirty="0" smtClean="0"/>
+              <a:t> </a:t>
+            </a:r>
+            <a:r>
+              <a:rPr lang="en-US" dirty="0" err="1" smtClean="0"/>
+              <a:t>tp</a:t>
+            </a:r>
+            <a:r>
+              <a:rPr lang="en-US" dirty="0" smtClean="0"/>
+              <a:t> </a:t>
+            </a:r>
+            <a:r>
+              <a:rPr lang="en-US" dirty="0" err="1" smtClean="0"/>
+              <a:t>fn</a:t>
+            </a:r>
+            <a:r>
+              <a:rPr lang="en-US" dirty="0" smtClean="0"/>
+              <a:t> and </a:t>
+            </a:r>
+            <a:r>
+              <a:rPr lang="en-US" dirty="0" err="1" smtClean="0"/>
+              <a:t>tn</a:t>
+            </a:r>
+            <a:r>
+              <a:rPr lang="en-US" dirty="0" smtClean="0"/>
+              <a:t> rates), and the ROC and AUC curve</a:t>
+            </a:r>
+          </a:p>
+          <a:p>
+            <a:pPr marL="742950" lvl="1" indent="-285750">
+              <a:buFont typeface="Wingdings" panose="05000000000000000000" pitchFamily="2" charset="2"/>
+              <a:buChar char="§"/>
+            </a:pPr>
+            <a:r>
+              <a:rPr lang="en-US" smtClean="0"/>
+              <a:t>Sub-sentence</a:t>
+            </a:r>
+          </a:p>
+          <a:p>
+            <a:endParaRPr lang="en-CA"/>
+          </a:p>
+        </p:txBody>
+      </p:sp>
+      <p:sp>
+        <p:nvSpPr>
+          <p:cNvPr id="4" name="Slide Number Placeholder 3"/>
+          <p:cNvSpPr>
+            <a:spLocks noGrp="1"/>
+          </p:cNvSpPr>
+          <p:nvPr>
+            <p:ph type="sldNum" sz="quarter" idx="10"/>
+          </p:nvPr>
+        </p:nvSpPr>
+        <p:spPr/>
+        <p:txBody>
+          <a:bodyPr/>
+          <a:lstStyle/>
+          <a:p>
+            <a:fld id="{8A4ECBF0-02C6-40DA-8E97-5B6C9ADE2689}" type="slidenum">
+              <a:rPr lang="en-CA" smtClean="0"/>
+              <a:t>11</a:t>
+            </a:fld>
+            <a:endParaRPr lang="en-CA"/>
+          </a:p>
+        </p:txBody>
+      </p:sp>
+    </p:spTree>
+    <p:extLst>
+      <p:ext uri="{BB962C8B-B14F-4D97-AF65-F5344CB8AC3E}">
+        <p14:creationId xmlns:p14="http://schemas.microsoft.com/office/powerpoint/2010/main" val="1008915142"/>
+      </p:ext>
+    </p:extLst>
+  </p:cSld>
+  <p:clrMapOvr>
+    <a:masterClrMapping/>
+  </p:clrMapOvr>
+</p:notes>
 </file>
 
 <file path=ppt/slideLayouts/slideLayout1.xml><?xml version="1.0" encoding="utf-8"?>
@@ -431,7 +1501,7 @@
           <a:p>
             <a:fld id="{1D8BD707-D9CF-40AE-B4C6-C98DA3205C09}" type="datetimeFigureOut">
               <a:rPr lang="en-US"/>
-              <a:t>2023-04-12</a:t>
+              <a:t>4/14/2023</a:t>
             </a:fld>
             <a:endParaRPr lang="en-US"/>
           </a:p>
@@ -611,7 +1681,7 @@
           <a:p>
             <a:fld id="{1D8BD707-D9CF-40AE-B4C6-C98DA3205C09}" type="datetimeFigureOut">
               <a:rPr lang="en-US"/>
-              <a:t>2023-04-12</a:t>
+              <a:t>4/14/2023</a:t>
             </a:fld>
             <a:endParaRPr lang="en-US"/>
           </a:p>
@@ -834,7 +1904,7 @@
           <a:p>
             <a:fld id="{1D8BD707-D9CF-40AE-B4C6-C98DA3205C09}" type="datetimeFigureOut">
               <a:rPr lang="en-US"/>
-              <a:t>2023-04-12</a:t>
+              <a:t>4/14/2023</a:t>
             </a:fld>
             <a:endParaRPr lang="en-US"/>
           </a:p>
@@ -991,7 +2061,7 @@
           <a:p>
             <a:fld id="{1D8BD707-D9CF-40AE-B4C6-C98DA3205C09}" type="datetimeFigureOut">
               <a:rPr lang="en-US"/>
-              <a:t>2023-04-12</a:t>
+              <a:t>4/14/2023</a:t>
             </a:fld>
             <a:endParaRPr lang="en-US"/>
           </a:p>
@@ -1177,7 +2247,7 @@
           <a:p>
             <a:fld id="{1D8BD707-D9CF-40AE-B4C6-C98DA3205C09}" type="datetimeFigureOut">
               <a:rPr lang="en-US"/>
-              <a:t>2023-04-12</a:t>
+              <a:t>4/14/2023</a:t>
             </a:fld>
             <a:endParaRPr lang="en-US"/>
           </a:p>
@@ -1455,7 +2525,7 @@
           <a:p>
             <a:fld id="{1D8BD707-D9CF-40AE-B4C6-C98DA3205C09}" type="datetimeFigureOut">
               <a:rPr lang="en-US"/>
-              <a:t>2023-04-12</a:t>
+              <a:t>4/14/2023</a:t>
             </a:fld>
             <a:endParaRPr lang="en-US"/>
           </a:p>
@@ -1962,7 +3032,7 @@
         <p:spPr>
           <a:xfrm>
             <a:off x="331250" y="250726"/>
-            <a:ext cx="4926550" cy="597599"/>
+            <a:ext cx="7974550" cy="597599"/>
           </a:xfrm>
           <a:prstGeom prst="rect">
             <a:avLst/>
@@ -1983,12 +3053,12 @@
               </a:spcBef>
             </a:pPr>
             <a:r>
-              <a:rPr lang="en-US" sz="3800" spc="-35" dirty="0">
+              <a:rPr lang="en-US" sz="3800" spc="-35" dirty="0" smtClean="0">
                 <a:solidFill>
                   <a:srgbClr val="F1CD00"/>
                 </a:solidFill>
               </a:rPr>
-              <a:t>Testing</a:t>
+              <a:t>Results: Confusion Matrix</a:t>
             </a:r>
             <a:endParaRPr sz="3800" dirty="0"/>
           </a:p>
@@ -2031,62 +3101,202 @@
           </a:p>
         </p:txBody>
       </p:sp>
-      <p:sp>
-        <p:nvSpPr>
-          <p:cNvPr id="4" name="Holder 3">
+      <p:pic>
+        <p:nvPicPr>
+          <p:cNvPr id="1027" name="Picture 3"/>
+          <p:cNvPicPr>
+            <a:picLocks noChangeAspect="1" noChangeArrowheads="1"/>
+          </p:cNvPicPr>
+          <p:nvPr/>
+        </p:nvPicPr>
+        <p:blipFill>
+          <a:blip r:embed="rId4">
             <a:extLst>
-              <a:ext uri="{FF2B5EF4-FFF2-40B4-BE49-F238E27FC236}">
-                <a16:creationId xmlns:a16="http://schemas.microsoft.com/office/drawing/2014/main" id="{66174911-866C-7EF1-606E-6A18F606D1BF}"/>
+              <a:ext uri="{28A0092B-C50C-407E-A947-70E740481C1C}">
+                <a14:useLocalDpi xmlns:a14="http://schemas.microsoft.com/office/drawing/2010/main" val="0"/>
               </a:ext>
             </a:extLst>
-          </p:cNvPr>
-          <p:cNvSpPr>
-            <a:spLocks noGrp="1"/>
-          </p:cNvSpPr>
-          <p:nvPr>
-            <p:ph type="body" idx="1"/>
-          </p:nvPr>
-        </p:nvSpPr>
-        <p:spPr>
+          </a:blip>
+          <a:srcRect/>
+          <a:stretch>
+            <a:fillRect/>
+          </a:stretch>
+        </p:blipFill>
+        <p:spPr bwMode="auto">
           <a:xfrm>
-            <a:off x="228600" y="1123950"/>
-            <a:ext cx="8661588" cy="553998"/>
+            <a:off x="4343400" y="1657350"/>
+            <a:ext cx="4382792" cy="2984029"/>
           </a:xfrm>
-        </p:spPr>
-        <p:txBody>
-          <a:bodyPr lIns="0" tIns="0" rIns="0" bIns="0"/>
-          <a:lstStyle>
-            <a:lvl1pPr>
-              <a:defRPr/>
-            </a:lvl1pPr>
-          </a:lstStyle>
+          <a:prstGeom prst="rect">
+            <a:avLst/>
+          </a:prstGeom>
+          <a:noFill/>
+          <a:ln>
+            <a:noFill/>
+          </a:ln>
+          <a:effectLst/>
+          <a:extLst>
+            <a:ext uri="{909E8E84-426E-40DD-AFC4-6F175D3DCCD1}">
+              <a14:hiddenFill xmlns:a14="http://schemas.microsoft.com/office/drawing/2010/main">
+                <a:solidFill>
+                  <a:schemeClr val="accent1"/>
+                </a:solidFill>
+              </a14:hiddenFill>
+            </a:ext>
+            <a:ext uri="{91240B29-F687-4F45-9708-019B960494DF}">
+              <a14:hiddenLine xmlns:a14="http://schemas.microsoft.com/office/drawing/2010/main" w="9525">
+                <a:solidFill>
+                  <a:schemeClr val="tx1"/>
+                </a:solidFill>
+                <a:miter lim="800000"/>
+                <a:headEnd/>
+                <a:tailEnd/>
+              </a14:hiddenLine>
+            </a:ext>
+            <a:ext uri="{AF507438-7753-43E0-B8FC-AC1667EBCBE1}">
+              <a14:hiddenEffects xmlns:a14="http://schemas.microsoft.com/office/drawing/2010/main">
+                <a:effectLst>
+                  <a:outerShdw dist="35921" dir="2700000" algn="ctr" rotWithShape="0">
+                    <a:schemeClr val="bg2"/>
+                  </a:outerShdw>
+                </a:effectLst>
+              </a14:hiddenEffects>
+            </a:ext>
+          </a:extLst>
+        </p:spPr>
+      </p:pic>
+      <p:sp>
+        <p:nvSpPr>
+          <p:cNvPr id="3" name="TextBox 2"/>
+          <p:cNvSpPr txBox="1"/>
+          <p:nvPr/>
+        </p:nvSpPr>
+        <p:spPr>
+          <a:xfrm>
+            <a:off x="4876800" y="1276350"/>
+            <a:ext cx="3048000" cy="381000"/>
+          </a:xfrm>
+          <a:prstGeom prst="rect">
+            <a:avLst/>
+          </a:prstGeom>
+          <a:noFill/>
+        </p:spPr>
+        <p:txBody>
+          <a:bodyPr wrap="square" rtlCol="0">
+            <a:spAutoFit/>
+          </a:bodyPr>
+          <a:lstStyle/>
+          <a:p>
+            <a:pPr algn="ctr"/>
+            <a:r>
+              <a:rPr lang="en-CA" dirty="0" smtClean="0"/>
+              <a:t>Confusion Matrix</a:t>
+            </a:r>
+            <a:endParaRPr lang="en-CA" dirty="0"/>
+          </a:p>
+        </p:txBody>
+      </p:sp>
+      <p:sp>
+        <p:nvSpPr>
+          <p:cNvPr id="4" name="TextBox 3"/>
+          <p:cNvSpPr txBox="1"/>
+          <p:nvPr/>
+        </p:nvSpPr>
+        <p:spPr>
+          <a:xfrm>
+            <a:off x="3810000" y="3061960"/>
+            <a:ext cx="762000" cy="261610"/>
+          </a:xfrm>
+          <a:prstGeom prst="rect">
+            <a:avLst/>
+          </a:prstGeom>
+          <a:noFill/>
+        </p:spPr>
+        <p:txBody>
+          <a:bodyPr wrap="square" rtlCol="0">
+            <a:spAutoFit/>
+          </a:bodyPr>
+          <a:lstStyle/>
+          <a:p>
+            <a:r>
+              <a:rPr lang="en-CA" sz="1100" dirty="0" smtClean="0"/>
+              <a:t>Predicted</a:t>
+            </a:r>
+            <a:endParaRPr lang="en-CA" sz="1100" dirty="0"/>
+          </a:p>
+        </p:txBody>
+      </p:sp>
+      <p:sp>
+        <p:nvSpPr>
+          <p:cNvPr id="8" name="TextBox 7"/>
+          <p:cNvSpPr txBox="1"/>
+          <p:nvPr/>
+        </p:nvSpPr>
+        <p:spPr>
+          <a:xfrm>
+            <a:off x="6019800" y="4510574"/>
+            <a:ext cx="762000" cy="261610"/>
+          </a:xfrm>
+          <a:prstGeom prst="rect">
+            <a:avLst/>
+          </a:prstGeom>
+          <a:noFill/>
+        </p:spPr>
+        <p:txBody>
+          <a:bodyPr wrap="square" rtlCol="0">
+            <a:spAutoFit/>
+          </a:bodyPr>
+          <a:lstStyle/>
+          <a:p>
+            <a:r>
+              <a:rPr lang="en-CA" sz="1100" dirty="0" smtClean="0"/>
+              <a:t>Actual</a:t>
+            </a:r>
+            <a:endParaRPr lang="en-CA" sz="1100" dirty="0"/>
+          </a:p>
+        </p:txBody>
+      </p:sp>
+      <p:sp>
+        <p:nvSpPr>
+          <p:cNvPr id="5" name="TextBox 4"/>
+          <p:cNvSpPr txBox="1"/>
+          <p:nvPr/>
+        </p:nvSpPr>
+        <p:spPr>
+          <a:xfrm>
+            <a:off x="533400" y="2549199"/>
+            <a:ext cx="2971800" cy="1200329"/>
+          </a:xfrm>
+          <a:prstGeom prst="rect">
+            <a:avLst/>
+          </a:prstGeom>
+          <a:noFill/>
+        </p:spPr>
+        <p:txBody>
+          <a:bodyPr wrap="square" rtlCol="0">
+            <a:spAutoFit/>
+          </a:bodyPr>
+          <a:lstStyle/>
           <a:p>
             <a:pPr marL="285750" indent="-285750">
-              <a:buFont typeface="Courier New" panose="02070309020205020404" pitchFamily="49" charset="0"/>
-              <a:buChar char="o"/>
-            </a:pPr>
-            <a:r>
-              <a:rPr lang="en-US" dirty="0"/>
-              <a:t>Test batch was 1580 images 930 of which were </a:t>
-            </a:r>
-            <a:r>
-              <a:rPr lang="en-US" dirty="0" err="1"/>
-              <a:t>dall</a:t>
-            </a:r>
-            <a:r>
-              <a:rPr lang="en-US" dirty="0"/>
-              <a:t>-e generated and 650 human made:</a:t>
-            </a:r>
-          </a:p>
-          <a:p>
-            <a:pPr marL="742950" lvl="1" indent="-285750">
-              <a:buFont typeface="Wingdings" panose="05000000000000000000" pitchFamily="2" charset="2"/>
-              <a:buChar char="§"/>
-            </a:pPr>
-            <a:r>
-              <a:rPr lang="en-US" dirty="0"/>
-              <a:t>Sub-sentence</a:t>
-            </a:r>
+              <a:buFont typeface="Arial" panose="020B0604020202020204" pitchFamily="34" charset="0"/>
+              <a:buChar char="•"/>
+            </a:pPr>
+            <a:r>
+              <a:rPr lang="en-CA" dirty="0" smtClean="0"/>
+              <a:t>100 incorrectly labeled DALLE-2 images</a:t>
+            </a:r>
+          </a:p>
+          <a:p>
+            <a:pPr marL="285750" indent="-285750">
+              <a:buFont typeface="Arial" panose="020B0604020202020204" pitchFamily="34" charset="0"/>
+              <a:buChar char="•"/>
+            </a:pPr>
+            <a:r>
+              <a:rPr lang="en-CA" dirty="0" smtClean="0"/>
+              <a:t>150 incorrectly labeled human-made images</a:t>
+            </a:r>
+            <a:endParaRPr lang="en-CA" dirty="0"/>
           </a:p>
         </p:txBody>
       </p:sp>
@@ -2096,7 +3306,7 @@
     </p:custDataLst>
     <p:extLst>
       <p:ext uri="{BB962C8B-B14F-4D97-AF65-F5344CB8AC3E}">
-        <p14:creationId xmlns:p14="http://schemas.microsoft.com/office/powerpoint/2010/main" val="1514545344"/>
+        <p14:creationId xmlns:p14="http://schemas.microsoft.com/office/powerpoint/2010/main" val="2817693167"/>
       </p:ext>
     </p:extLst>
   </p:cSld>
@@ -2144,7 +3354,7 @@
         <p:spPr>
           <a:xfrm>
             <a:off x="331250" y="250726"/>
-            <a:ext cx="4926550" cy="597599"/>
+            <a:ext cx="7974550" cy="597599"/>
           </a:xfrm>
           <a:prstGeom prst="rect">
             <a:avLst/>
@@ -2165,12 +3375,12 @@
               </a:spcBef>
             </a:pPr>
             <a:r>
-              <a:rPr lang="en-US" sz="3800" spc="-35" dirty="0">
+              <a:rPr lang="en-US" sz="3800" spc="-35" dirty="0" smtClean="0">
                 <a:solidFill>
                   <a:srgbClr val="F1CD00"/>
                 </a:solidFill>
               </a:rPr>
-              <a:t>Results</a:t>
+              <a:t>Results: Confusion Matrix</a:t>
             </a:r>
             <a:endParaRPr sz="3800" dirty="0"/>
           </a:p>
@@ -2213,103 +3423,121 @@
           </a:p>
         </p:txBody>
       </p:sp>
-      <p:sp>
-        <p:nvSpPr>
-          <p:cNvPr id="4" name="Holder 3">
+      <p:pic>
+        <p:nvPicPr>
+          <p:cNvPr id="2050" name="Picture 2"/>
+          <p:cNvPicPr>
+            <a:picLocks noChangeAspect="1" noChangeArrowheads="1"/>
+          </p:cNvPicPr>
+          <p:nvPr/>
+        </p:nvPicPr>
+        <p:blipFill>
+          <a:blip r:embed="rId4">
             <a:extLst>
-              <a:ext uri="{FF2B5EF4-FFF2-40B4-BE49-F238E27FC236}">
-                <a16:creationId xmlns:a16="http://schemas.microsoft.com/office/drawing/2014/main" id="{66174911-866C-7EF1-606E-6A18F606D1BF}"/>
+              <a:ext uri="{28A0092B-C50C-407E-A947-70E740481C1C}">
+                <a14:useLocalDpi xmlns:a14="http://schemas.microsoft.com/office/drawing/2010/main" val="0"/>
               </a:ext>
             </a:extLst>
-          </p:cNvPr>
-          <p:cNvSpPr>
-            <a:spLocks noGrp="1"/>
-          </p:cNvSpPr>
-          <p:nvPr>
-            <p:ph type="body" idx="1"/>
-          </p:nvPr>
-        </p:nvSpPr>
-        <p:spPr>
+          </a:blip>
+          <a:srcRect/>
+          <a:stretch>
+            <a:fillRect/>
+          </a:stretch>
+        </p:blipFill>
+        <p:spPr bwMode="auto">
           <a:xfrm>
-            <a:off x="228600" y="1123950"/>
-            <a:ext cx="8661588" cy="1661993"/>
+            <a:off x="228600" y="1184275"/>
+            <a:ext cx="3999583" cy="3749675"/>
           </a:xfrm>
-        </p:spPr>
-        <p:txBody>
-          <a:bodyPr lIns="0" tIns="0" rIns="0" bIns="0"/>
-          <a:lstStyle>
-            <a:lvl1pPr>
-              <a:defRPr/>
-            </a:lvl1pPr>
-          </a:lstStyle>
+          <a:prstGeom prst="rect">
+            <a:avLst/>
+          </a:prstGeom>
+          <a:noFill/>
+          <a:ln>
+            <a:noFill/>
+          </a:ln>
+          <a:effectLst/>
+          <a:extLst>
+            <a:ext uri="{909E8E84-426E-40DD-AFC4-6F175D3DCCD1}">
+              <a14:hiddenFill xmlns:a14="http://schemas.microsoft.com/office/drawing/2010/main">
+                <a:solidFill>
+                  <a:schemeClr val="accent1"/>
+                </a:solidFill>
+              </a14:hiddenFill>
+            </a:ext>
+            <a:ext uri="{91240B29-F687-4F45-9708-019B960494DF}">
+              <a14:hiddenLine xmlns:a14="http://schemas.microsoft.com/office/drawing/2010/main" w="9525">
+                <a:solidFill>
+                  <a:schemeClr val="tx1"/>
+                </a:solidFill>
+                <a:miter lim="800000"/>
+                <a:headEnd/>
+                <a:tailEnd/>
+              </a14:hiddenLine>
+            </a:ext>
+            <a:ext uri="{AF507438-7753-43E0-B8FC-AC1667EBCBE1}">
+              <a14:hiddenEffects xmlns:a14="http://schemas.microsoft.com/office/drawing/2010/main">
+                <a:effectLst>
+                  <a:outerShdw dist="35921" dir="2700000" algn="ctr" rotWithShape="0">
+                    <a:schemeClr val="bg2"/>
+                  </a:outerShdw>
+                </a:effectLst>
+              </a14:hiddenEffects>
+            </a:ext>
+          </a:extLst>
+        </p:spPr>
+      </p:pic>
+      <p:sp>
+        <p:nvSpPr>
+          <p:cNvPr id="10" name="TextBox 9"/>
+          <p:cNvSpPr txBox="1"/>
+          <p:nvPr/>
+        </p:nvSpPr>
+        <p:spPr>
+          <a:xfrm>
+            <a:off x="4876800" y="2343150"/>
+            <a:ext cx="2971800" cy="1754326"/>
+          </a:xfrm>
+          <a:prstGeom prst="rect">
+            <a:avLst/>
+          </a:prstGeom>
+          <a:noFill/>
+        </p:spPr>
+        <p:txBody>
+          <a:bodyPr wrap="square" rtlCol="0">
+            <a:spAutoFit/>
+          </a:bodyPr>
+          <a:lstStyle/>
           <a:p>
             <a:pPr marL="285750" indent="-285750">
-              <a:buFont typeface="Courier New" panose="02070309020205020404" pitchFamily="49" charset="0"/>
-              <a:buChar char="o"/>
-            </a:pPr>
-            <a:r>
-              <a:rPr lang="en-US" dirty="0"/>
-              <a:t>The 50 epochs on the graph for accuracy are because of the 10 epochs for 5 batches (10x5 = 50):</a:t>
+              <a:buFont typeface="Arial" panose="020B0604020202020204" pitchFamily="34" charset="0"/>
+              <a:buChar char="•"/>
+            </a:pPr>
+            <a:r>
+              <a:rPr lang="en-CA" dirty="0" smtClean="0"/>
+              <a:t>Area under curve: 0.91</a:t>
             </a:r>
           </a:p>
           <a:p>
             <a:pPr marL="285750" indent="-285750">
-              <a:buFont typeface="Courier New" panose="02070309020205020404" pitchFamily="49" charset="0"/>
-              <a:buChar char="o"/>
-            </a:pPr>
-            <a:endParaRPr lang="en-US" dirty="0"/>
+              <a:buFont typeface="Arial" panose="020B0604020202020204" pitchFamily="34" charset="0"/>
+              <a:buChar char="•"/>
+            </a:pPr>
+            <a:r>
+              <a:rPr lang="en-CA" dirty="0" smtClean="0"/>
+              <a:t>High performing sensitivity and specificity trade-off</a:t>
+            </a:r>
           </a:p>
           <a:p>
             <a:pPr marL="285750" indent="-285750">
-              <a:buFont typeface="Courier New" panose="02070309020205020404" pitchFamily="49" charset="0"/>
-              <a:buChar char="o"/>
-            </a:pPr>
-            <a:r>
-              <a:rPr lang="en-US" dirty="0"/>
-              <a:t>I’ve made graphs of accuracy, confusion matrix (for </a:t>
-            </a:r>
-            <a:r>
-              <a:rPr lang="en-US" dirty="0" err="1"/>
-              <a:t>fp</a:t>
-            </a:r>
-            <a:r>
-              <a:rPr lang="en-US" dirty="0"/>
-              <a:t> </a:t>
-            </a:r>
-            <a:r>
-              <a:rPr lang="en-US" dirty="0" err="1"/>
-              <a:t>tp</a:t>
-            </a:r>
-            <a:r>
-              <a:rPr lang="en-US" dirty="0"/>
-              <a:t> </a:t>
-            </a:r>
-            <a:r>
-              <a:rPr lang="en-US" dirty="0" err="1"/>
-              <a:t>fn</a:t>
-            </a:r>
-            <a:r>
-              <a:rPr lang="en-US" dirty="0"/>
-              <a:t> and </a:t>
-            </a:r>
-            <a:r>
-              <a:rPr lang="en-US" dirty="0" err="1"/>
-              <a:t>tn</a:t>
-            </a:r>
-            <a:r>
-              <a:rPr lang="en-US" dirty="0"/>
-              <a:t> rates), and the ROC and AUC curve</a:t>
-            </a:r>
-          </a:p>
-          <a:p>
-            <a:pPr marL="742950" lvl="1" indent="-285750">
-              <a:buFont typeface="Wingdings" panose="05000000000000000000" pitchFamily="2" charset="2"/>
-              <a:buChar char="§"/>
-            </a:pPr>
-            <a:r>
-              <a:rPr lang="en-US" dirty="0"/>
-              <a:t>Sub-sentence</a:t>
-            </a:r>
+              <a:buFont typeface="Arial" panose="020B0604020202020204" pitchFamily="34" charset="0"/>
+              <a:buChar char="•"/>
+            </a:pPr>
+            <a:r>
+              <a:rPr lang="en-CA" dirty="0" smtClean="0"/>
+              <a:t>Relatively high true positive and low false positive rate</a:t>
+            </a:r>
+            <a:endParaRPr lang="en-CA" dirty="0"/>
           </a:p>
         </p:txBody>
       </p:sp>
@@ -2319,7 +3547,7 @@
     </p:custDataLst>
     <p:extLst>
       <p:ext uri="{BB962C8B-B14F-4D97-AF65-F5344CB8AC3E}">
-        <p14:creationId xmlns:p14="http://schemas.microsoft.com/office/powerpoint/2010/main" val="1495395977"/>
+        <p14:creationId xmlns:p14="http://schemas.microsoft.com/office/powerpoint/2010/main" val="2399597523"/>
       </p:ext>
     </p:extLst>
   </p:cSld>
@@ -2441,7 +3669,7 @@
           <p:cNvPr id="4" name="Holder 3">
             <a:extLst>
               <a:ext uri="{FF2B5EF4-FFF2-40B4-BE49-F238E27FC236}">
-                <a16:creationId xmlns:a16="http://schemas.microsoft.com/office/drawing/2014/main" id="{66174911-866C-7EF1-606E-6A18F606D1BF}"/>
+                <a16:creationId xmlns:a16="http://schemas.microsoft.com/office/drawing/2014/main" xmlns="" id="{66174911-866C-7EF1-606E-6A18F606D1BF}"/>
               </a:ext>
             </a:extLst>
           </p:cNvPr>
@@ -2455,7 +3683,7 @@
         <p:spPr>
           <a:xfrm>
             <a:off x="228600" y="1123950"/>
-            <a:ext cx="8661588" cy="553998"/>
+            <a:ext cx="8661588" cy="1661993"/>
           </a:xfrm>
         </p:spPr>
         <p:txBody>
@@ -2466,24 +3694,57 @@
             </a:lvl1pPr>
           </a:lstStyle>
           <a:p>
+            <a:r>
+              <a:rPr lang="en-US" dirty="0" smtClean="0"/>
+              <a:t>Ideas:</a:t>
+            </a:r>
+          </a:p>
+          <a:p>
+            <a:pPr marL="285750" indent="-285750">
+              <a:buFont typeface="Arial" panose="020B0604020202020204" pitchFamily="34" charset="0"/>
+              <a:buChar char="•"/>
+            </a:pPr>
+            <a:r>
+              <a:rPr lang="en-US" dirty="0" smtClean="0"/>
+              <a:t>Scalability</a:t>
+            </a:r>
+          </a:p>
+          <a:p>
+            <a:pPr marL="285750" indent="-285750">
+              <a:buFont typeface="Arial" panose="020B0604020202020204" pitchFamily="34" charset="0"/>
+              <a:buChar char="•"/>
+            </a:pPr>
+            <a:r>
+              <a:rPr lang="en-US" dirty="0" smtClean="0"/>
+              <a:t>Limitations</a:t>
+            </a:r>
+          </a:p>
+          <a:p>
+            <a:pPr marL="285750" indent="-285750">
+              <a:buFont typeface="Arial" panose="020B0604020202020204" pitchFamily="34" charset="0"/>
+              <a:buChar char="•"/>
+            </a:pPr>
+            <a:r>
+              <a:rPr lang="en-US" dirty="0" smtClean="0"/>
+              <a:t>Future work</a:t>
+            </a:r>
+          </a:p>
+          <a:p>
+            <a:pPr marL="285750" indent="-285750">
+              <a:buFont typeface="Arial" panose="020B0604020202020204" pitchFamily="34" charset="0"/>
+              <a:buChar char="•"/>
+            </a:pPr>
+            <a:r>
+              <a:rPr lang="en-US" dirty="0" smtClean="0"/>
+              <a:t>Importance of work and usage</a:t>
+            </a:r>
+          </a:p>
+          <a:p>
             <a:pPr marL="285750" indent="-285750">
               <a:buFont typeface="Courier New" panose="02070309020205020404" pitchFamily="49" charset="0"/>
               <a:buChar char="o"/>
             </a:pPr>
-            <a:r>
-              <a:rPr lang="en-US" dirty="0"/>
-              <a:t>Sentence:</a:t>
-            </a:r>
-          </a:p>
-          <a:p>
-            <a:pPr marL="742950" lvl="1" indent="-285750">
-              <a:buFont typeface="Wingdings" panose="05000000000000000000" pitchFamily="2" charset="2"/>
-              <a:buChar char="§"/>
-            </a:pPr>
-            <a:r>
-              <a:rPr lang="en-US" dirty="0"/>
-              <a:t>Sub-sentence</a:t>
-            </a:r>
+            <a:endParaRPr lang="en-US" dirty="0"/>
           </a:p>
         </p:txBody>
       </p:sp>
@@ -2615,7 +3876,7 @@
           <p:cNvPr id="4" name="Holder 3">
             <a:extLst>
               <a:ext uri="{FF2B5EF4-FFF2-40B4-BE49-F238E27FC236}">
-                <a16:creationId xmlns:a16="http://schemas.microsoft.com/office/drawing/2014/main" id="{66174911-866C-7EF1-606E-6A18F606D1BF}"/>
+                <a16:creationId xmlns:a16="http://schemas.microsoft.com/office/drawing/2014/main" xmlns="" id="{66174911-866C-7EF1-606E-6A18F606D1BF}"/>
               </a:ext>
             </a:extLst>
           </p:cNvPr>
@@ -2890,7 +4151,7 @@
           <p:cNvPr id="4" name="Holder 3">
             <a:extLst>
               <a:ext uri="{FF2B5EF4-FFF2-40B4-BE49-F238E27FC236}">
-                <a16:creationId xmlns:a16="http://schemas.microsoft.com/office/drawing/2014/main" id="{66174911-866C-7EF1-606E-6A18F606D1BF}"/>
+                <a16:creationId xmlns:a16="http://schemas.microsoft.com/office/drawing/2014/main" xmlns="" id="{66174911-866C-7EF1-606E-6A18F606D1BF}"/>
               </a:ext>
             </a:extLst>
           </p:cNvPr>
@@ -3059,7 +4320,7 @@
           <p:cNvPr id="4" name="Holder 3">
             <a:extLst>
               <a:ext uri="{FF2B5EF4-FFF2-40B4-BE49-F238E27FC236}">
-                <a16:creationId xmlns:a16="http://schemas.microsoft.com/office/drawing/2014/main" id="{66174911-866C-7EF1-606E-6A18F606D1BF}"/>
+                <a16:creationId xmlns:a16="http://schemas.microsoft.com/office/drawing/2014/main" xmlns="" id="{66174911-866C-7EF1-606E-6A18F606D1BF}"/>
               </a:ext>
             </a:extLst>
           </p:cNvPr>
@@ -3243,7 +4504,7 @@
           <p:cNvPr id="4" name="Holder 3">
             <a:extLst>
               <a:ext uri="{FF2B5EF4-FFF2-40B4-BE49-F238E27FC236}">
-                <a16:creationId xmlns:a16="http://schemas.microsoft.com/office/drawing/2014/main" id="{66174911-866C-7EF1-606E-6A18F606D1BF}"/>
+                <a16:creationId xmlns:a16="http://schemas.microsoft.com/office/drawing/2014/main" xmlns="" id="{66174911-866C-7EF1-606E-6A18F606D1BF}"/>
               </a:ext>
             </a:extLst>
           </p:cNvPr>
@@ -3417,7 +4678,7 @@
           <p:cNvPr id="4" name="Holder 3">
             <a:extLst>
               <a:ext uri="{FF2B5EF4-FFF2-40B4-BE49-F238E27FC236}">
-                <a16:creationId xmlns:a16="http://schemas.microsoft.com/office/drawing/2014/main" id="{66174911-866C-7EF1-606E-6A18F606D1BF}"/>
+                <a16:creationId xmlns:a16="http://schemas.microsoft.com/office/drawing/2014/main" xmlns="" id="{66174911-866C-7EF1-606E-6A18F606D1BF}"/>
               </a:ext>
             </a:extLst>
           </p:cNvPr>
@@ -3599,7 +4860,7 @@
           <p:cNvPr id="4" name="Holder 3">
             <a:extLst>
               <a:ext uri="{FF2B5EF4-FFF2-40B4-BE49-F238E27FC236}">
-                <a16:creationId xmlns:a16="http://schemas.microsoft.com/office/drawing/2014/main" id="{66174911-866C-7EF1-606E-6A18F606D1BF}"/>
+                <a16:creationId xmlns:a16="http://schemas.microsoft.com/office/drawing/2014/main" xmlns="" id="{66174911-866C-7EF1-606E-6A18F606D1BF}"/>
               </a:ext>
             </a:extLst>
           </p:cNvPr>
@@ -3613,7 +4874,7 @@
         <p:spPr>
           <a:xfrm>
             <a:off x="228600" y="1123950"/>
-            <a:ext cx="8661588" cy="3323987"/>
+            <a:ext cx="8661588" cy="2492990"/>
           </a:xfrm>
         </p:spPr>
         <p:txBody>
@@ -3625,25 +4886,23 @@
           </a:lstStyle>
           <a:p>
             <a:pPr marL="285750" indent="-285750">
-              <a:buFont typeface="Courier New" panose="02070309020205020404" pitchFamily="49" charset="0"/>
-              <a:buChar char="o"/>
+              <a:buFont typeface="Arial" panose="020B0604020202020204" pitchFamily="34" charset="0"/>
+              <a:buChar char="•"/>
             </a:pPr>
             <a:r>
               <a:rPr lang="en-US" dirty="0"/>
-              <a:t>Dall-e images were scraped from the website: 'https://dalle2.gallery/#search-random’:</a:t>
-            </a:r>
+              <a:t>Dall-e images were scraped from the website: 'https://dalle2.gallery/#search-random</a:t>
+            </a:r>
+            <a:r>
+              <a:rPr lang="en-US" dirty="0" smtClean="0"/>
+              <a:t>’:</a:t>
+            </a:r>
+            <a:endParaRPr lang="en-US" dirty="0"/>
           </a:p>
           <a:p>
             <a:pPr marL="285750" indent="-285750">
-              <a:buFont typeface="Courier New" panose="02070309020205020404" pitchFamily="49" charset="0"/>
-              <a:buChar char="o"/>
-            </a:pPr>
-            <a:endParaRPr lang="en-US" dirty="0"/>
-          </a:p>
-          <a:p>
-            <a:pPr marL="285750" indent="-285750">
-              <a:buFont typeface="Courier New" panose="02070309020205020404" pitchFamily="49" charset="0"/>
-              <a:buChar char="o"/>
+              <a:buFont typeface="Arial" panose="020B0604020202020204" pitchFamily="34" charset="0"/>
+              <a:buChar char="•"/>
             </a:pPr>
             <a:r>
               <a:rPr lang="en-US" dirty="0"/>
@@ -3655,20 +4914,18 @@
             </a:r>
             <a:r>
               <a:rPr lang="en-US" dirty="0"/>
-              <a:t> file saved as a list “categories”.</a:t>
-            </a:r>
+              <a:t> file saved as a list “categories</a:t>
+            </a:r>
+            <a:r>
+              <a:rPr lang="en-US" dirty="0" smtClean="0"/>
+              <a:t>”.</a:t>
+            </a:r>
+            <a:endParaRPr lang="en-US" dirty="0"/>
           </a:p>
           <a:p>
             <a:pPr marL="285750" indent="-285750">
-              <a:buFont typeface="Courier New" panose="02070309020205020404" pitchFamily="49" charset="0"/>
-              <a:buChar char="o"/>
-            </a:pPr>
-            <a:endParaRPr lang="en-US" dirty="0"/>
-          </a:p>
-          <a:p>
-            <a:pPr marL="285750" indent="-285750">
-              <a:buFont typeface="Courier New" panose="02070309020205020404" pitchFamily="49" charset="0"/>
-              <a:buChar char="o"/>
+              <a:buFont typeface="Arial" panose="020B0604020202020204" pitchFamily="34" charset="0"/>
+              <a:buChar char="•"/>
             </a:pPr>
             <a:r>
               <a:rPr lang="en-US" dirty="0"/>
@@ -3688,43 +4945,46 @@
             </a:r>
             <a:r>
               <a:rPr lang="en-US" dirty="0"/>
-              <a:t>) for both Dall-e and human made images</a:t>
-            </a:r>
+              <a:t>) for both Dall-e and human made </a:t>
+            </a:r>
+            <a:r>
+              <a:rPr lang="en-US" dirty="0" smtClean="0"/>
+              <a:t>images</a:t>
+            </a:r>
+            <a:endParaRPr lang="en-US" dirty="0"/>
           </a:p>
           <a:p>
             <a:pPr marL="285750" indent="-285750">
-              <a:buFont typeface="Courier New" panose="02070309020205020404" pitchFamily="49" charset="0"/>
-              <a:buChar char="o"/>
-            </a:pPr>
-            <a:endParaRPr lang="en-US" dirty="0"/>
-          </a:p>
-          <a:p>
-            <a:pPr marL="285750" indent="-285750">
-              <a:buFont typeface="Courier New" panose="02070309020205020404" pitchFamily="49" charset="0"/>
-              <a:buChar char="o"/>
+              <a:buFont typeface="Arial" panose="020B0604020202020204" pitchFamily="34" charset="0"/>
+              <a:buChar char="•"/>
             </a:pPr>
             <a:r>
               <a:rPr lang="en-US" dirty="0"/>
               <a:t>Images were left in RGB format as an array. So an array of shape(255,245,3). Values were scaled to </a:t>
             </a:r>
             <a:r>
-              <a:rPr lang="en-US" dirty="0" err="1"/>
-              <a:t>bebetween</a:t>
+              <a:rPr lang="en-US" dirty="0" smtClean="0"/>
+              <a:t>be between </a:t>
             </a:r>
             <a:r>
               <a:rPr lang="en-US" dirty="0"/>
-              <a:t> 0-&gt;1</a:t>
-            </a:r>
-          </a:p>
-          <a:p>
-            <a:pPr marL="742950" lvl="1" indent="-285750">
-              <a:buFont typeface="Wingdings" panose="05000000000000000000" pitchFamily="2" charset="2"/>
-              <a:buChar char="§"/>
-            </a:pPr>
-            <a:r>
-              <a:rPr lang="en-US" dirty="0"/>
-              <a:t>Sub-sentence</a:t>
-            </a:r>
+              <a:t>0-&gt;</a:t>
+            </a:r>
+            <a:r>
+              <a:rPr lang="en-US" dirty="0" smtClean="0"/>
+              <a:t>1</a:t>
+            </a:r>
+          </a:p>
+          <a:p>
+            <a:pPr marL="285750" indent="-285750">
+              <a:buFont typeface="Arial" panose="020B0604020202020204" pitchFamily="34" charset="0"/>
+              <a:buChar char="•"/>
+            </a:pPr>
+            <a:r>
+              <a:rPr lang="en-US" dirty="0" smtClean="0"/>
+              <a:t>Images cropped to avoid fitting to watermarks</a:t>
+            </a:r>
+            <a:endParaRPr lang="en-US" dirty="0"/>
           </a:p>
         </p:txBody>
       </p:sp>
@@ -3808,7 +5068,7 @@
                   <a:srgbClr val="F1CD00"/>
                 </a:solidFill>
               </a:rPr>
-              <a:t>Data Collection</a:t>
+              <a:t>Model Details</a:t>
             </a:r>
             <a:endParaRPr sz="3800" dirty="0"/>
           </a:p>
@@ -3853,59 +5113,71 @@
       </p:sp>
       <p:sp>
         <p:nvSpPr>
-          <p:cNvPr id="4" name="Holder 3">
-            <a:extLst>
-              <a:ext uri="{FF2B5EF4-FFF2-40B4-BE49-F238E27FC236}">
-                <a16:creationId xmlns:a16="http://schemas.microsoft.com/office/drawing/2014/main" id="{66174911-866C-7EF1-606E-6A18F606D1BF}"/>
-              </a:ext>
-            </a:extLst>
-          </p:cNvPr>
-          <p:cNvSpPr>
-            <a:spLocks noGrp="1"/>
-          </p:cNvSpPr>
-          <p:nvPr>
-            <p:ph type="body" idx="1"/>
-          </p:nvPr>
+          <p:cNvPr id="3" name="TextBox 2"/>
+          <p:cNvSpPr txBox="1"/>
+          <p:nvPr/>
         </p:nvSpPr>
         <p:spPr>
           <a:xfrm>
-            <a:off x="228600" y="1123950"/>
-            <a:ext cx="8661588" cy="830997"/>
+            <a:off x="762000" y="1276350"/>
+            <a:ext cx="6934200" cy="1477328"/>
           </a:xfrm>
-        </p:spPr>
-        <p:txBody>
-          <a:bodyPr lIns="0" tIns="0" rIns="0" bIns="0"/>
-          <a:lstStyle>
-            <a:lvl1pPr>
-              <a:defRPr/>
-            </a:lvl1pPr>
-          </a:lstStyle>
+          <a:prstGeom prst="rect">
+            <a:avLst/>
+          </a:prstGeom>
+          <a:noFill/>
+        </p:spPr>
+        <p:txBody>
+          <a:bodyPr wrap="square" rtlCol="0">
+            <a:spAutoFit/>
+          </a:bodyPr>
+          <a:lstStyle/>
           <a:p>
             <a:pPr marL="285750" indent="-285750">
-              <a:buFont typeface="Courier New" panose="02070309020205020404" pitchFamily="49" charset="0"/>
-              <a:buChar char="o"/>
-            </a:pPr>
+              <a:buFont typeface="Arial" panose="020B0604020202020204" pitchFamily="34" charset="0"/>
+              <a:buChar char="•"/>
+            </a:pPr>
+            <a:r>
+              <a:rPr lang="en-US" dirty="0" smtClean="0"/>
+              <a:t>Convolutional </a:t>
+            </a:r>
             <a:r>
               <a:rPr lang="en-US" dirty="0"/>
-              <a:t>Images were processed to be of shape 255x245 pixels, this crops out the bottom of </a:t>
+              <a:t>Neural Network (CNN) to classify images into two categories: "Human" and "DALLE-2</a:t>
+            </a:r>
+            <a:r>
+              <a:rPr lang="en-US" dirty="0" smtClean="0"/>
+              <a:t>".</a:t>
+            </a:r>
+          </a:p>
+          <a:p>
+            <a:pPr marL="285750" indent="-285750">
+              <a:buFont typeface="Arial" panose="020B0604020202020204" pitchFamily="34" charset="0"/>
+              <a:buChar char="•"/>
+            </a:pPr>
+            <a:r>
+              <a:rPr lang="en-US" dirty="0"/>
+              <a:t>T</a:t>
+            </a:r>
+            <a:r>
+              <a:rPr lang="en-US" dirty="0" smtClean="0"/>
+              <a:t>wo </a:t>
+            </a:r>
+            <a:r>
+              <a:rPr lang="en-US" dirty="0"/>
+              <a:t>sets of convolutional layers, each followed by max pooling, and two fully connected (dense) layers with </a:t>
             </a:r>
             <a:r>
               <a:rPr lang="en-US" dirty="0" err="1"/>
-              <a:t>dall</a:t>
+              <a:t>ReLU</a:t>
             </a:r>
             <a:r>
               <a:rPr lang="en-US" dirty="0"/>
-              <a:t>-e pictures removing the watermark to avoid fitting to this watermark</a:t>
-            </a:r>
-          </a:p>
-          <a:p>
-            <a:pPr marL="742950" lvl="1" indent="-285750">
-              <a:buFont typeface="Wingdings" panose="05000000000000000000" pitchFamily="2" charset="2"/>
-              <a:buChar char="§"/>
-            </a:pPr>
-            <a:r>
-              <a:rPr lang="en-US" dirty="0"/>
-              <a:t>Sub-sentence</a:t>
+              <a:t> activation function and a final output layer with sigmoid activation function</a:t>
+            </a:r>
+            <a:r>
+              <a:rPr lang="en-US" dirty="0" smtClean="0"/>
+              <a:t>.</a:t>
             </a:r>
           </a:p>
         </p:txBody>
@@ -3916,7 +5188,7 @@
     </p:custDataLst>
     <p:extLst>
       <p:ext uri="{BB962C8B-B14F-4D97-AF65-F5344CB8AC3E}">
-        <p14:creationId xmlns:p14="http://schemas.microsoft.com/office/powerpoint/2010/main" val="1229424816"/>
+        <p14:creationId xmlns:p14="http://schemas.microsoft.com/office/powerpoint/2010/main" val="2491263076"/>
       </p:ext>
     </p:extLst>
   </p:cSld>
@@ -3985,12 +5257,12 @@
               </a:spcBef>
             </a:pPr>
             <a:r>
-              <a:rPr lang="en-US" sz="3800" spc="-35" dirty="0">
+              <a:rPr lang="en-US" sz="3800" spc="-35" dirty="0" smtClean="0">
                 <a:solidFill>
                   <a:srgbClr val="F1CD00"/>
                 </a:solidFill>
               </a:rPr>
-              <a:t>Model Details</a:t>
+              <a:t>Training &amp; Testing </a:t>
             </a:r>
             <a:endParaRPr sz="3800" dirty="0"/>
           </a:p>
@@ -4038,7 +5310,7 @@
           <p:cNvPr id="4" name="Holder 3">
             <a:extLst>
               <a:ext uri="{FF2B5EF4-FFF2-40B4-BE49-F238E27FC236}">
-                <a16:creationId xmlns:a16="http://schemas.microsoft.com/office/drawing/2014/main" id="{66174911-866C-7EF1-606E-6A18F606D1BF}"/>
+                <a16:creationId xmlns:a16="http://schemas.microsoft.com/office/drawing/2014/main" xmlns="" id="{66174911-866C-7EF1-606E-6A18F606D1BF}"/>
               </a:ext>
             </a:extLst>
           </p:cNvPr>
@@ -4052,7 +5324,7 @@
         <p:spPr>
           <a:xfrm>
             <a:off x="228600" y="1123950"/>
-            <a:ext cx="8661588" cy="830997"/>
+            <a:ext cx="8661588" cy="2492990"/>
           </a:xfrm>
         </p:spPr>
         <p:txBody>
@@ -4064,31 +5336,84 @@
           </a:lstStyle>
           <a:p>
             <a:pPr marL="285750" indent="-285750">
+              <a:buFont typeface="Arial" panose="020B0604020202020204" pitchFamily="34" charset="0"/>
+              <a:buChar char="•"/>
+            </a:pPr>
+            <a:r>
+              <a:rPr lang="en-US" dirty="0"/>
+              <a:t>T</a:t>
+            </a:r>
+            <a:r>
+              <a:rPr lang="en-US" dirty="0" smtClean="0"/>
+              <a:t>raining </a:t>
+            </a:r>
+            <a:r>
+              <a:rPr lang="en-US" dirty="0"/>
+              <a:t>is performed for 10 epochs, with each epoch using a different batch of </a:t>
+            </a:r>
+            <a:r>
+              <a:rPr lang="en-US" dirty="0" smtClean="0"/>
+              <a:t>data from 1800 images (split evenly between human and DALLE-2 generated images)</a:t>
+            </a:r>
+          </a:p>
+          <a:p>
+            <a:pPr marL="285750" indent="-285750">
+              <a:buFont typeface="Arial" panose="020B0604020202020204" pitchFamily="34" charset="0"/>
+              <a:buChar char="•"/>
+            </a:pPr>
+            <a:r>
+              <a:rPr lang="en-US" dirty="0" smtClean="0"/>
+              <a:t>Testing performed on batch of 930 DALLE-2 and 650 human generated images data</a:t>
+            </a:r>
+          </a:p>
+          <a:p>
+            <a:pPr marL="285750" indent="-285750">
+              <a:buFont typeface="Arial" panose="020B0604020202020204" pitchFamily="34" charset="0"/>
+              <a:buChar char="•"/>
+            </a:pPr>
+            <a:r>
+              <a:rPr lang="en-US" dirty="0"/>
+              <a:t>“Adam” optimizer is used with a learning rate of 0.00005</a:t>
+            </a:r>
+          </a:p>
+          <a:p>
+            <a:pPr marL="285750" indent="-285750">
+              <a:buFont typeface="Arial" panose="020B0604020202020204" pitchFamily="34" charset="0"/>
+              <a:buChar char="•"/>
+            </a:pPr>
+            <a:r>
+              <a:rPr lang="en-US" dirty="0"/>
+              <a:t>Binary cross-entropy loss function is used to calculate the loss during training</a:t>
+            </a:r>
+            <a:endParaRPr lang="en-CA" dirty="0"/>
+          </a:p>
+          <a:p>
+            <a:pPr marL="285750" indent="-285750">
+              <a:buFont typeface="Arial" panose="020B0604020202020204" pitchFamily="34" charset="0"/>
+              <a:buChar char="•"/>
+            </a:pPr>
+            <a:endParaRPr lang="en-US" dirty="0" smtClean="0"/>
+          </a:p>
+          <a:p>
+            <a:pPr marL="285750" indent="-285750">
+              <a:buFont typeface="Arial" panose="020B0604020202020204" pitchFamily="34" charset="0"/>
+              <a:buChar char="•"/>
+            </a:pPr>
+            <a:endParaRPr lang="en-US" dirty="0" smtClean="0"/>
+          </a:p>
+          <a:p>
+            <a:pPr marL="285750" indent="-285750">
+              <a:buFont typeface="Arial" panose="020B0604020202020204" pitchFamily="34" charset="0"/>
+              <a:buChar char="•"/>
+            </a:pPr>
+            <a:endParaRPr lang="en-US" dirty="0" smtClean="0"/>
+          </a:p>
+          <a:p>
+            <a:pPr marL="285750" indent="-285750">
               <a:buFont typeface="Courier New" panose="02070309020205020404" pitchFamily="49" charset="0"/>
               <a:buChar char="o"/>
             </a:pPr>
-            <a:r>
-              <a:rPr lang="en-US" dirty="0"/>
-              <a:t>Used a convolutional network for the model. Shape and size of the neural network can be found on the train-</a:t>
-            </a:r>
-            <a:r>
-              <a:rPr lang="en-US" dirty="0" err="1"/>
-              <a:t>results.ipynb</a:t>
-            </a:r>
-            <a:r>
-              <a:rPr lang="en-US" dirty="0"/>
-              <a:t> file:</a:t>
-            </a:r>
-          </a:p>
-          <a:p>
-            <a:pPr marL="742950" lvl="1" indent="-285750">
-              <a:buFont typeface="Wingdings" panose="05000000000000000000" pitchFamily="2" charset="2"/>
-              <a:buChar char="§"/>
-            </a:pPr>
-            <a:r>
-              <a:rPr lang="en-US" dirty="0"/>
-              <a:t>Sub-sentence</a:t>
-            </a:r>
+            <a:endParaRPr lang="en-US" dirty="0"/>
           </a:p>
         </p:txBody>
       </p:sp>
@@ -4098,7 +5423,7 @@
     </p:custDataLst>
     <p:extLst>
       <p:ext uri="{BB962C8B-B14F-4D97-AF65-F5344CB8AC3E}">
-        <p14:creationId xmlns:p14="http://schemas.microsoft.com/office/powerpoint/2010/main" val="2491263076"/>
+        <p14:creationId xmlns:p14="http://schemas.microsoft.com/office/powerpoint/2010/main" val="541953598"/>
       </p:ext>
     </p:extLst>
   </p:cSld>
@@ -4167,12 +5492,12 @@
               </a:spcBef>
             </a:pPr>
             <a:r>
-              <a:rPr lang="en-US" sz="3800" spc="-35" dirty="0">
+              <a:rPr lang="en-US" sz="3800" spc="-35" dirty="0" smtClean="0">
                 <a:solidFill>
                   <a:srgbClr val="F1CD00"/>
                 </a:solidFill>
               </a:rPr>
-              <a:t>Training </a:t>
+              <a:t>Results: Accuracy</a:t>
             </a:r>
             <a:endParaRPr sz="3800" dirty="0"/>
           </a:p>
@@ -4215,53 +5540,99 @@
           </a:p>
         </p:txBody>
       </p:sp>
-      <p:sp>
-        <p:nvSpPr>
-          <p:cNvPr id="4" name="Holder 3">
+      <p:pic>
+        <p:nvPicPr>
+          <p:cNvPr id="1026" name="Picture 2"/>
+          <p:cNvPicPr>
+            <a:picLocks noChangeAspect="1" noChangeArrowheads="1"/>
+          </p:cNvPicPr>
+          <p:nvPr/>
+        </p:nvPicPr>
+        <p:blipFill>
+          <a:blip r:embed="rId4">
             <a:extLst>
-              <a:ext uri="{FF2B5EF4-FFF2-40B4-BE49-F238E27FC236}">
-                <a16:creationId xmlns:a16="http://schemas.microsoft.com/office/drawing/2014/main" id="{66174911-866C-7EF1-606E-6A18F606D1BF}"/>
+              <a:ext uri="{28A0092B-C50C-407E-A947-70E740481C1C}">
+                <a14:useLocalDpi xmlns:a14="http://schemas.microsoft.com/office/drawing/2010/main" val="0"/>
               </a:ext>
             </a:extLst>
-          </p:cNvPr>
-          <p:cNvSpPr>
-            <a:spLocks noGrp="1"/>
-          </p:cNvSpPr>
-          <p:nvPr>
-            <p:ph type="body" idx="1"/>
-          </p:nvPr>
-        </p:nvSpPr>
-        <p:spPr>
+          </a:blip>
+          <a:srcRect/>
+          <a:stretch>
+            <a:fillRect/>
+          </a:stretch>
+        </p:blipFill>
+        <p:spPr bwMode="auto">
           <a:xfrm>
-            <a:off x="228600" y="1123950"/>
-            <a:ext cx="8661588" cy="1107996"/>
+            <a:off x="152399" y="971550"/>
+            <a:ext cx="3999209" cy="4038600"/>
           </a:xfrm>
-        </p:spPr>
-        <p:txBody>
-          <a:bodyPr lIns="0" tIns="0" rIns="0" bIns="0"/>
-          <a:lstStyle>
-            <a:lvl1pPr>
-              <a:defRPr/>
-            </a:lvl1pPr>
-          </a:lstStyle>
+          <a:prstGeom prst="rect">
+            <a:avLst/>
+          </a:prstGeom>
+          <a:noFill/>
+          <a:ln>
+            <a:noFill/>
+          </a:ln>
+          <a:effectLst/>
+          <a:extLst>
+            <a:ext uri="{909E8E84-426E-40DD-AFC4-6F175D3DCCD1}">
+              <a14:hiddenFill xmlns:a14="http://schemas.microsoft.com/office/drawing/2010/main">
+                <a:solidFill>
+                  <a:schemeClr val="accent1"/>
+                </a:solidFill>
+              </a14:hiddenFill>
+            </a:ext>
+            <a:ext uri="{91240B29-F687-4F45-9708-019B960494DF}">
+              <a14:hiddenLine xmlns:a14="http://schemas.microsoft.com/office/drawing/2010/main" w="9525">
+                <a:solidFill>
+                  <a:schemeClr val="tx1"/>
+                </a:solidFill>
+                <a:miter lim="800000"/>
+                <a:headEnd/>
+                <a:tailEnd/>
+              </a14:hiddenLine>
+            </a:ext>
+            <a:ext uri="{AF507438-7753-43E0-B8FC-AC1667EBCBE1}">
+              <a14:hiddenEffects xmlns:a14="http://schemas.microsoft.com/office/drawing/2010/main">
+                <a:effectLst>
+                  <a:outerShdw dist="35921" dir="2700000" algn="ctr" rotWithShape="0">
+                    <a:schemeClr val="bg2"/>
+                  </a:outerShdw>
+                </a:effectLst>
+              </a14:hiddenEffects>
+            </a:ext>
+          </a:extLst>
+        </p:spPr>
+      </p:pic>
+      <p:sp>
+        <p:nvSpPr>
+          <p:cNvPr id="8" name="TextBox 7"/>
+          <p:cNvSpPr txBox="1"/>
+          <p:nvPr/>
+        </p:nvSpPr>
+        <p:spPr>
+          <a:xfrm>
+            <a:off x="4876800" y="2390685"/>
+            <a:ext cx="2971800" cy="923330"/>
+          </a:xfrm>
+          <a:prstGeom prst="rect">
+            <a:avLst/>
+          </a:prstGeom>
+          <a:noFill/>
+        </p:spPr>
+        <p:txBody>
+          <a:bodyPr wrap="square" rtlCol="0">
+            <a:spAutoFit/>
+          </a:bodyPr>
+          <a:lstStyle/>
           <a:p>
             <a:pPr marL="285750" indent="-285750">
-              <a:buFont typeface="Courier New" panose="02070309020205020404" pitchFamily="49" charset="0"/>
-              <a:buChar char="o"/>
-            </a:pPr>
-            <a:r>
-              <a:rPr lang="en-US" dirty="0"/>
-              <a:t>Model was trained for 10 epochs on 5 batches of 1800 images. So a total of 9000 images were used to train the model split equally between DALL-E generated and Human made images:</a:t>
-            </a:r>
-          </a:p>
-          <a:p>
-            <a:pPr marL="742950" lvl="1" indent="-285750">
-              <a:buFont typeface="Wingdings" panose="05000000000000000000" pitchFamily="2" charset="2"/>
-              <a:buChar char="§"/>
-            </a:pPr>
-            <a:r>
-              <a:rPr lang="en-US" dirty="0"/>
-              <a:t>Sub-sentence</a:t>
+              <a:buFont typeface="Arial" panose="020B0604020202020204" pitchFamily="34" charset="0"/>
+              <a:buChar char="•"/>
+            </a:pPr>
+            <a:r>
+              <a:rPr lang="en-CA" dirty="0" smtClean="0"/>
+              <a:t>Optimal validation set accuracy ~80% around 20 epochs</a:t>
             </a:r>
           </a:p>
         </p:txBody>
@@ -4272,7 +5643,7 @@
     </p:custDataLst>
     <p:extLst>
       <p:ext uri="{BB962C8B-B14F-4D97-AF65-F5344CB8AC3E}">
-        <p14:creationId xmlns:p14="http://schemas.microsoft.com/office/powerpoint/2010/main" val="541953598"/>
+        <p14:creationId xmlns:p14="http://schemas.microsoft.com/office/powerpoint/2010/main" val="1495395977"/>
       </p:ext>
     </p:extLst>
   </p:cSld>
@@ -4643,4 +6014,289 @@
   <a:objectDefaults/>
   <a:extraClrSchemeLst/>
 </a:theme>
+</file>
+
+<file path=ppt/theme/theme2.xml><?xml version="1.0" encoding="utf-8"?>
+<a:theme xmlns:a="http://schemas.openxmlformats.org/drawingml/2006/main" name="Office Theme">
+  <a:themeElements>
+    <a:clrScheme name="Office">
+      <a:dk1>
+        <a:sysClr val="windowText" lastClr="000000"/>
+      </a:dk1>
+      <a:lt1>
+        <a:sysClr val="window" lastClr="FFFFFF"/>
+      </a:lt1>
+      <a:dk2>
+        <a:srgbClr val="1F497D"/>
+      </a:dk2>
+      <a:lt2>
+        <a:srgbClr val="EEECE1"/>
+      </a:lt2>
+      <a:accent1>
+        <a:srgbClr val="4F81BD"/>
+      </a:accent1>
+      <a:accent2>
+        <a:srgbClr val="C0504D"/>
+      </a:accent2>
+      <a:accent3>
+        <a:srgbClr val="9BBB59"/>
+      </a:accent3>
+      <a:accent4>
+        <a:srgbClr val="8064A2"/>
+      </a:accent4>
+      <a:accent5>
+        <a:srgbClr val="4BACC6"/>
+      </a:accent5>
+      <a:accent6>
+        <a:srgbClr val="F79646"/>
+      </a:accent6>
+      <a:hlink>
+        <a:srgbClr val="0000FF"/>
+      </a:hlink>
+      <a:folHlink>
+        <a:srgbClr val="800080"/>
+      </a:folHlink>
+    </a:clrScheme>
+    <a:fontScheme name="Office">
+      <a:majorFont>
+        <a:latin typeface="Calibri"/>
+        <a:ea typeface=""/>
+        <a:cs typeface=""/>
+        <a:font script="Jpan" typeface="ＭＳ Ｐゴシック"/>
+        <a:font script="Hang" typeface="맑은 고딕"/>
+        <a:font script="Hans" typeface="宋体"/>
+        <a:font script="Hant" typeface="新細明體"/>
+        <a:font script="Arab" typeface="Times New Roman"/>
+        <a:font script="Hebr" typeface="Times New Roman"/>
+        <a:font script="Thai" typeface="Angsana New"/>
+        <a:font script="Ethi" typeface="Nyala"/>
+        <a:font script="Beng" typeface="Vrinda"/>
+        <a:font script="Gujr" typeface="Shruti"/>
+        <a:font script="Khmr" typeface="MoolBoran"/>
+        <a:font script="Knda" typeface="Tunga"/>
+        <a:font script="Guru" typeface="Raavi"/>
+        <a:font script="Cans" typeface="Euphemia"/>
+        <a:font script="Cher" typeface="Plantagenet Cherokee"/>
+        <a:font script="Yiii" typeface="Microsoft Yi Baiti"/>
+        <a:font script="Tibt" typeface="Microsoft Himalaya"/>
+        <a:font script="Thaa" typeface="MV Boli"/>
+        <a:font script="Deva" typeface="Mangal"/>
+        <a:font script="Telu" typeface="Gautami"/>
+        <a:font script="Taml" typeface="Latha"/>
+        <a:font script="Syrc" typeface="Estrangelo Edessa"/>
+        <a:font script="Orya" typeface="Kalinga"/>
+        <a:font script="Mlym" typeface="Kartika"/>
+        <a:font script="Laoo" typeface="DokChampa"/>
+        <a:font script="Sinh" typeface="Iskoola Pota"/>
+        <a:font script="Mong" typeface="Mongolian Baiti"/>
+        <a:font script="Viet" typeface="Times New Roman"/>
+        <a:font script="Uigh" typeface="Microsoft Uighur"/>
+        <a:font script="Geor" typeface="Sylfaen"/>
+      </a:majorFont>
+      <a:minorFont>
+        <a:latin typeface="Calibri"/>
+        <a:ea typeface=""/>
+        <a:cs typeface=""/>
+        <a:font script="Jpan" typeface="ＭＳ Ｐゴシック"/>
+        <a:font script="Hang" typeface="맑은 고딕"/>
+        <a:font script="Hans" typeface="宋体"/>
+        <a:font script="Hant" typeface="新細明體"/>
+        <a:font script="Arab" typeface="Arial"/>
+        <a:font script="Hebr" typeface="Arial"/>
+        <a:font script="Thai" typeface="Cordia New"/>
+        <a:font script="Ethi" typeface="Nyala"/>
+        <a:font script="Beng" typeface="Vrinda"/>
+        <a:font script="Gujr" typeface="Shruti"/>
+        <a:font script="Khmr" typeface="DaunPenh"/>
+        <a:font script="Knda" typeface="Tunga"/>
+        <a:font script="Guru" typeface="Raavi"/>
+        <a:font script="Cans" typeface="Euphemia"/>
+        <a:font script="Cher" typeface="Plantagenet Cherokee"/>
+        <a:font script="Yiii" typeface="Microsoft Yi Baiti"/>
+        <a:font script="Tibt" typeface="Microsoft Himalaya"/>
+        <a:font script="Thaa" typeface="MV Boli"/>
+        <a:font script="Deva" typeface="Mangal"/>
+        <a:font script="Telu" typeface="Gautami"/>
+        <a:font script="Taml" typeface="Latha"/>
+        <a:font script="Syrc" typeface="Estrangelo Edessa"/>
+        <a:font script="Orya" typeface="Kalinga"/>
+        <a:font script="Mlym" typeface="Kartika"/>
+        <a:font script="Laoo" typeface="DokChampa"/>
+        <a:font script="Sinh" typeface="Iskoola Pota"/>
+        <a:font script="Mong" typeface="Mongolian Baiti"/>
+        <a:font script="Viet" typeface="Arial"/>
+        <a:font script="Uigh" typeface="Microsoft Uighur"/>
+        <a:font script="Geor" typeface="Sylfaen"/>
+      </a:minorFont>
+    </a:fontScheme>
+    <a:fmtScheme name="Office">
+      <a:fillStyleLst>
+        <a:solidFill>
+          <a:schemeClr val="phClr"/>
+        </a:solidFill>
+        <a:gradFill rotWithShape="1">
+          <a:gsLst>
+            <a:gs pos="0">
+              <a:schemeClr val="phClr">
+                <a:tint val="50000"/>
+                <a:satMod val="300000"/>
+              </a:schemeClr>
+            </a:gs>
+            <a:gs pos="35000">
+              <a:schemeClr val="phClr">
+                <a:tint val="37000"/>
+                <a:satMod val="300000"/>
+              </a:schemeClr>
+            </a:gs>
+            <a:gs pos="100000">
+              <a:schemeClr val="phClr">
+                <a:tint val="15000"/>
+                <a:satMod val="350000"/>
+              </a:schemeClr>
+            </a:gs>
+          </a:gsLst>
+          <a:lin ang="16200000" scaled="1"/>
+        </a:gradFill>
+        <a:gradFill rotWithShape="1">
+          <a:gsLst>
+            <a:gs pos="0">
+              <a:schemeClr val="phClr">
+                <a:shade val="51000"/>
+                <a:satMod val="130000"/>
+              </a:schemeClr>
+            </a:gs>
+            <a:gs pos="80000">
+              <a:schemeClr val="phClr">
+                <a:shade val="93000"/>
+                <a:satMod val="130000"/>
+              </a:schemeClr>
+            </a:gs>
+            <a:gs pos="100000">
+              <a:schemeClr val="phClr">
+                <a:shade val="94000"/>
+                <a:satMod val="135000"/>
+              </a:schemeClr>
+            </a:gs>
+          </a:gsLst>
+          <a:lin ang="16200000" scaled="0"/>
+        </a:gradFill>
+      </a:fillStyleLst>
+      <a:lnStyleLst>
+        <a:ln w="9525" cap="flat" cmpd="sng" algn="ctr">
+          <a:solidFill>
+            <a:schemeClr val="phClr">
+              <a:shade val="95000"/>
+              <a:satMod val="105000"/>
+            </a:schemeClr>
+          </a:solidFill>
+          <a:prstDash val="solid"/>
+        </a:ln>
+        <a:ln w="25400" cap="flat" cmpd="sng" algn="ctr">
+          <a:solidFill>
+            <a:schemeClr val="phClr"/>
+          </a:solidFill>
+          <a:prstDash val="solid"/>
+        </a:ln>
+        <a:ln w="38100" cap="flat" cmpd="sng" algn="ctr">
+          <a:solidFill>
+            <a:schemeClr val="phClr"/>
+          </a:solidFill>
+          <a:prstDash val="solid"/>
+        </a:ln>
+      </a:lnStyleLst>
+      <a:effectStyleLst>
+        <a:effectStyle>
+          <a:effectLst>
+            <a:outerShdw blurRad="40000" dist="20000" dir="5400000" rotWithShape="0">
+              <a:srgbClr val="000000">
+                <a:alpha val="38000"/>
+              </a:srgbClr>
+            </a:outerShdw>
+          </a:effectLst>
+        </a:effectStyle>
+        <a:effectStyle>
+          <a:effectLst>
+            <a:outerShdw blurRad="40000" dist="23000" dir="5400000" rotWithShape="0">
+              <a:srgbClr val="000000">
+                <a:alpha val="35000"/>
+              </a:srgbClr>
+            </a:outerShdw>
+          </a:effectLst>
+        </a:effectStyle>
+        <a:effectStyle>
+          <a:effectLst>
+            <a:outerShdw blurRad="40000" dist="23000" dir="5400000" rotWithShape="0">
+              <a:srgbClr val="000000">
+                <a:alpha val="35000"/>
+              </a:srgbClr>
+            </a:outerShdw>
+          </a:effectLst>
+          <a:scene3d>
+            <a:camera prst="orthographicFront">
+              <a:rot lat="0" lon="0" rev="0"/>
+            </a:camera>
+            <a:lightRig rig="threePt" dir="t">
+              <a:rot lat="0" lon="0" rev="1200000"/>
+            </a:lightRig>
+          </a:scene3d>
+          <a:sp3d>
+            <a:bevelT w="63500" h="25400"/>
+          </a:sp3d>
+        </a:effectStyle>
+      </a:effectStyleLst>
+      <a:bgFillStyleLst>
+        <a:solidFill>
+          <a:schemeClr val="phClr"/>
+        </a:solidFill>
+        <a:gradFill rotWithShape="1">
+          <a:gsLst>
+            <a:gs pos="0">
+              <a:schemeClr val="phClr">
+                <a:tint val="40000"/>
+                <a:satMod val="350000"/>
+              </a:schemeClr>
+            </a:gs>
+            <a:gs pos="40000">
+              <a:schemeClr val="phClr">
+                <a:tint val="45000"/>
+                <a:shade val="99000"/>
+                <a:satMod val="350000"/>
+              </a:schemeClr>
+            </a:gs>
+            <a:gs pos="100000">
+              <a:schemeClr val="phClr">
+                <a:shade val="20000"/>
+                <a:satMod val="255000"/>
+              </a:schemeClr>
+            </a:gs>
+          </a:gsLst>
+          <a:path path="circle">
+            <a:fillToRect l="50000" t="-80000" r="50000" b="180000"/>
+          </a:path>
+        </a:gradFill>
+        <a:gradFill rotWithShape="1">
+          <a:gsLst>
+            <a:gs pos="0">
+              <a:schemeClr val="phClr">
+                <a:tint val="80000"/>
+                <a:satMod val="300000"/>
+              </a:schemeClr>
+            </a:gs>
+            <a:gs pos="100000">
+              <a:schemeClr val="phClr">
+                <a:shade val="30000"/>
+                <a:satMod val="200000"/>
+              </a:schemeClr>
+            </a:gs>
+          </a:gsLst>
+          <a:path path="circle">
+            <a:fillToRect l="50000" t="50000" r="50000" b="50000"/>
+          </a:path>
+        </a:gradFill>
+      </a:bgFillStyleLst>
+    </a:fmtScheme>
+  </a:themeElements>
+  <a:objectDefaults/>
+  <a:extraClrSchemeLst/>
+</a:theme>
 </file>
</xml_diff>